<commit_message>
added slide to explain TD to presentation
</commit_message>
<xml_diff>
--- a/doc/Presentation.pptx
+++ b/doc/Presentation.pptx
@@ -4,9 +4,13 @@
   <p:sldMasterIdLst>
     <p:sldMasterId id="2147483708" r:id="rId1"/>
   </p:sldMasterIdLst>
+  <p:notesMasterIdLst>
+    <p:notesMasterId r:id="rId5"/>
+  </p:notesMasterIdLst>
   <p:sldIdLst>
     <p:sldId id="256" r:id="rId2"/>
     <p:sldId id="257" r:id="rId3"/>
+    <p:sldId id="258" r:id="rId4"/>
   </p:sldIdLst>
   <p:sldSz cx="12192000" cy="6858000"/>
   <p:notesSz cx="6858000" cy="9144000"/>
@@ -105,7 +109,362 @@
       </a:defRPr>
     </a:lvl9pPr>
   </p:defaultTextStyle>
+  <p:extLst>
+    <p:ext uri="{EFAFB233-063F-42B5-8137-9DF3F51BA10A}">
+      <p15:sldGuideLst xmlns:p15="http://schemas.microsoft.com/office/powerpoint/2012/main"/>
+    </p:ext>
+  </p:extLst>
 </p:presentation>
+</file>
+
+<file path=ppt/notesMasters/notesMaster1.xml><?xml version="1.0" encoding="utf-8"?>
+<p:notesMaster xmlns:a="http://schemas.openxmlformats.org/drawingml/2006/main" xmlns:r="http://schemas.openxmlformats.org/officeDocument/2006/relationships" xmlns:p="http://schemas.openxmlformats.org/presentationml/2006/main">
+  <p:cSld>
+    <p:bg>
+      <p:bgRef idx="1001">
+        <a:schemeClr val="bg1"/>
+      </p:bgRef>
+    </p:bg>
+    <p:spTree>
+      <p:nvGrpSpPr>
+        <p:cNvPr id="1" name=""/>
+        <p:cNvGrpSpPr/>
+        <p:nvPr/>
+      </p:nvGrpSpPr>
+      <p:grpSpPr>
+        <a:xfrm>
+          <a:off x="0" y="0"/>
+          <a:ext cx="0" cy="0"/>
+          <a:chOff x="0" y="0"/>
+          <a:chExt cx="0" cy="0"/>
+        </a:xfrm>
+      </p:grpSpPr>
+      <p:sp>
+        <p:nvSpPr>
+          <p:cNvPr id="2" name="Header Placeholder 1"/>
+          <p:cNvSpPr>
+            <a:spLocks noGrp="1"/>
+          </p:cNvSpPr>
+          <p:nvPr>
+            <p:ph type="hdr" sz="quarter"/>
+          </p:nvPr>
+        </p:nvSpPr>
+        <p:spPr>
+          <a:xfrm>
+            <a:off x="0" y="0"/>
+            <a:ext cx="2971800" cy="458788"/>
+          </a:xfrm>
+          <a:prstGeom prst="rect">
+            <a:avLst/>
+          </a:prstGeom>
+        </p:spPr>
+        <p:txBody>
+          <a:bodyPr vert="horz" lIns="91440" tIns="45720" rIns="91440" bIns="45720" rtlCol="0"/>
+          <a:lstStyle>
+            <a:lvl1pPr algn="l">
+              <a:defRPr sz="1200"/>
+            </a:lvl1pPr>
+          </a:lstStyle>
+          <a:p>
+            <a:endParaRPr lang="en-US"/>
+          </a:p>
+        </p:txBody>
+      </p:sp>
+      <p:sp>
+        <p:nvSpPr>
+          <p:cNvPr id="3" name="Date Placeholder 2"/>
+          <p:cNvSpPr>
+            <a:spLocks noGrp="1"/>
+          </p:cNvSpPr>
+          <p:nvPr>
+            <p:ph type="dt" idx="1"/>
+          </p:nvPr>
+        </p:nvSpPr>
+        <p:spPr>
+          <a:xfrm>
+            <a:off x="3884613" y="0"/>
+            <a:ext cx="2971800" cy="458788"/>
+          </a:xfrm>
+          <a:prstGeom prst="rect">
+            <a:avLst/>
+          </a:prstGeom>
+        </p:spPr>
+        <p:txBody>
+          <a:bodyPr vert="horz" lIns="91440" tIns="45720" rIns="91440" bIns="45720" rtlCol="0"/>
+          <a:lstStyle>
+            <a:lvl1pPr algn="r">
+              <a:defRPr sz="1200"/>
+            </a:lvl1pPr>
+          </a:lstStyle>
+          <a:p>
+            <a:fld id="{996702D7-FFC7-4541-8679-A800B838F073}" type="datetimeFigureOut">
+              <a:rPr lang="en-US" smtClean="0"/>
+              <a:t>10/2/17</a:t>
+            </a:fld>
+            <a:endParaRPr lang="en-US"/>
+          </a:p>
+        </p:txBody>
+      </p:sp>
+      <p:sp>
+        <p:nvSpPr>
+          <p:cNvPr id="4" name="Slide Image Placeholder 3"/>
+          <p:cNvSpPr>
+            <a:spLocks noGrp="1" noRot="1" noChangeAspect="1"/>
+          </p:cNvSpPr>
+          <p:nvPr>
+            <p:ph type="sldImg" idx="2"/>
+          </p:nvPr>
+        </p:nvSpPr>
+        <p:spPr>
+          <a:xfrm>
+            <a:off x="685800" y="1143000"/>
+            <a:ext cx="5486400" cy="3086100"/>
+          </a:xfrm>
+          <a:prstGeom prst="rect">
+            <a:avLst/>
+          </a:prstGeom>
+          <a:noFill/>
+          <a:ln w="12700">
+            <a:solidFill>
+              <a:prstClr val="black"/>
+            </a:solidFill>
+          </a:ln>
+        </p:spPr>
+        <p:txBody>
+          <a:bodyPr vert="horz" lIns="91440" tIns="45720" rIns="91440" bIns="45720" rtlCol="0" anchor="ctr"/>
+          <a:lstStyle/>
+          <a:p>
+            <a:endParaRPr lang="en-US"/>
+          </a:p>
+        </p:txBody>
+      </p:sp>
+      <p:sp>
+        <p:nvSpPr>
+          <p:cNvPr id="5" name="Notes Placeholder 4"/>
+          <p:cNvSpPr>
+            <a:spLocks noGrp="1"/>
+          </p:cNvSpPr>
+          <p:nvPr>
+            <p:ph type="body" sz="quarter" idx="3"/>
+          </p:nvPr>
+        </p:nvSpPr>
+        <p:spPr>
+          <a:xfrm>
+            <a:off x="685800" y="4400550"/>
+            <a:ext cx="5486400" cy="3600450"/>
+          </a:xfrm>
+          <a:prstGeom prst="rect">
+            <a:avLst/>
+          </a:prstGeom>
+        </p:spPr>
+        <p:txBody>
+          <a:bodyPr vert="horz" lIns="91440" tIns="45720" rIns="91440" bIns="45720" rtlCol="0"/>
+          <a:lstStyle/>
+          <a:p>
+            <a:pPr lvl="0"/>
+            <a:r>
+              <a:rPr lang="en-US" smtClean="0"/>
+              <a:t>Click to edit Master text styles</a:t>
+            </a:r>
+          </a:p>
+          <a:p>
+            <a:pPr lvl="1"/>
+            <a:r>
+              <a:rPr lang="en-US" smtClean="0"/>
+              <a:t>Second level</a:t>
+            </a:r>
+          </a:p>
+          <a:p>
+            <a:pPr lvl="2"/>
+            <a:r>
+              <a:rPr lang="en-US" smtClean="0"/>
+              <a:t>Third level</a:t>
+            </a:r>
+          </a:p>
+          <a:p>
+            <a:pPr lvl="3"/>
+            <a:r>
+              <a:rPr lang="en-US" smtClean="0"/>
+              <a:t>Fourth level</a:t>
+            </a:r>
+          </a:p>
+          <a:p>
+            <a:pPr lvl="4"/>
+            <a:r>
+              <a:rPr lang="en-US" smtClean="0"/>
+              <a:t>Fifth level</a:t>
+            </a:r>
+            <a:endParaRPr lang="en-US"/>
+          </a:p>
+        </p:txBody>
+      </p:sp>
+      <p:sp>
+        <p:nvSpPr>
+          <p:cNvPr id="6" name="Footer Placeholder 5"/>
+          <p:cNvSpPr>
+            <a:spLocks noGrp="1"/>
+          </p:cNvSpPr>
+          <p:nvPr>
+            <p:ph type="ftr" sz="quarter" idx="4"/>
+          </p:nvPr>
+        </p:nvSpPr>
+        <p:spPr>
+          <a:xfrm>
+            <a:off x="0" y="8685213"/>
+            <a:ext cx="2971800" cy="458787"/>
+          </a:xfrm>
+          <a:prstGeom prst="rect">
+            <a:avLst/>
+          </a:prstGeom>
+        </p:spPr>
+        <p:txBody>
+          <a:bodyPr vert="horz" lIns="91440" tIns="45720" rIns="91440" bIns="45720" rtlCol="0" anchor="b"/>
+          <a:lstStyle>
+            <a:lvl1pPr algn="l">
+              <a:defRPr sz="1200"/>
+            </a:lvl1pPr>
+          </a:lstStyle>
+          <a:p>
+            <a:endParaRPr lang="en-US"/>
+          </a:p>
+        </p:txBody>
+      </p:sp>
+      <p:sp>
+        <p:nvSpPr>
+          <p:cNvPr id="7" name="Slide Number Placeholder 6"/>
+          <p:cNvSpPr>
+            <a:spLocks noGrp="1"/>
+          </p:cNvSpPr>
+          <p:nvPr>
+            <p:ph type="sldNum" sz="quarter" idx="5"/>
+          </p:nvPr>
+        </p:nvSpPr>
+        <p:spPr>
+          <a:xfrm>
+            <a:off x="3884613" y="8685213"/>
+            <a:ext cx="2971800" cy="458787"/>
+          </a:xfrm>
+          <a:prstGeom prst="rect">
+            <a:avLst/>
+          </a:prstGeom>
+        </p:spPr>
+        <p:txBody>
+          <a:bodyPr vert="horz" lIns="91440" tIns="45720" rIns="91440" bIns="45720" rtlCol="0" anchor="b"/>
+          <a:lstStyle>
+            <a:lvl1pPr algn="r">
+              <a:defRPr sz="1200"/>
+            </a:lvl1pPr>
+          </a:lstStyle>
+          <a:p>
+            <a:fld id="{A4838B1D-A33A-4C45-A183-851BF801C5ED}" type="slidenum">
+              <a:rPr lang="en-US" smtClean="0"/>
+              <a:t>‹#›</a:t>
+            </a:fld>
+            <a:endParaRPr lang="en-US"/>
+          </a:p>
+        </p:txBody>
+      </p:sp>
+    </p:spTree>
+    <p:extLst>
+      <p:ext uri="{BB962C8B-B14F-4D97-AF65-F5344CB8AC3E}">
+        <p14:creationId xmlns:p14="http://schemas.microsoft.com/office/powerpoint/2010/main" val="295567210"/>
+      </p:ext>
+    </p:extLst>
+  </p:cSld>
+  <p:clrMap bg1="lt1" tx1="dk1" bg2="lt2" tx2="dk2" accent1="accent1" accent2="accent2" accent3="accent3" accent4="accent4" accent5="accent5" accent6="accent6" hlink="hlink" folHlink="folHlink"/>
+  <p:notesStyle>
+    <a:lvl1pPr marL="0" algn="l" defTabSz="914400" rtl="0" eaLnBrk="1" latinLnBrk="0" hangingPunct="1">
+      <a:defRPr sz="1200" kern="1200">
+        <a:solidFill>
+          <a:schemeClr val="tx1"/>
+        </a:solidFill>
+        <a:latin typeface="+mn-lt"/>
+        <a:ea typeface="+mn-ea"/>
+        <a:cs typeface="+mn-cs"/>
+      </a:defRPr>
+    </a:lvl1pPr>
+    <a:lvl2pPr marL="457200" algn="l" defTabSz="914400" rtl="0" eaLnBrk="1" latinLnBrk="0" hangingPunct="1">
+      <a:defRPr sz="1200" kern="1200">
+        <a:solidFill>
+          <a:schemeClr val="tx1"/>
+        </a:solidFill>
+        <a:latin typeface="+mn-lt"/>
+        <a:ea typeface="+mn-ea"/>
+        <a:cs typeface="+mn-cs"/>
+      </a:defRPr>
+    </a:lvl2pPr>
+    <a:lvl3pPr marL="914400" algn="l" defTabSz="914400" rtl="0" eaLnBrk="1" latinLnBrk="0" hangingPunct="1">
+      <a:defRPr sz="1200" kern="1200">
+        <a:solidFill>
+          <a:schemeClr val="tx1"/>
+        </a:solidFill>
+        <a:latin typeface="+mn-lt"/>
+        <a:ea typeface="+mn-ea"/>
+        <a:cs typeface="+mn-cs"/>
+      </a:defRPr>
+    </a:lvl3pPr>
+    <a:lvl4pPr marL="1371600" algn="l" defTabSz="914400" rtl="0" eaLnBrk="1" latinLnBrk="0" hangingPunct="1">
+      <a:defRPr sz="1200" kern="1200">
+        <a:solidFill>
+          <a:schemeClr val="tx1"/>
+        </a:solidFill>
+        <a:latin typeface="+mn-lt"/>
+        <a:ea typeface="+mn-ea"/>
+        <a:cs typeface="+mn-cs"/>
+      </a:defRPr>
+    </a:lvl4pPr>
+    <a:lvl5pPr marL="1828800" algn="l" defTabSz="914400" rtl="0" eaLnBrk="1" latinLnBrk="0" hangingPunct="1">
+      <a:defRPr sz="1200" kern="1200">
+        <a:solidFill>
+          <a:schemeClr val="tx1"/>
+        </a:solidFill>
+        <a:latin typeface="+mn-lt"/>
+        <a:ea typeface="+mn-ea"/>
+        <a:cs typeface="+mn-cs"/>
+      </a:defRPr>
+    </a:lvl5pPr>
+    <a:lvl6pPr marL="2286000" algn="l" defTabSz="914400" rtl="0" eaLnBrk="1" latinLnBrk="0" hangingPunct="1">
+      <a:defRPr sz="1200" kern="1200">
+        <a:solidFill>
+          <a:schemeClr val="tx1"/>
+        </a:solidFill>
+        <a:latin typeface="+mn-lt"/>
+        <a:ea typeface="+mn-ea"/>
+        <a:cs typeface="+mn-cs"/>
+      </a:defRPr>
+    </a:lvl6pPr>
+    <a:lvl7pPr marL="2743200" algn="l" defTabSz="914400" rtl="0" eaLnBrk="1" latinLnBrk="0" hangingPunct="1">
+      <a:defRPr sz="1200" kern="1200">
+        <a:solidFill>
+          <a:schemeClr val="tx1"/>
+        </a:solidFill>
+        <a:latin typeface="+mn-lt"/>
+        <a:ea typeface="+mn-ea"/>
+        <a:cs typeface="+mn-cs"/>
+      </a:defRPr>
+    </a:lvl7pPr>
+    <a:lvl8pPr marL="3200400" algn="l" defTabSz="914400" rtl="0" eaLnBrk="1" latinLnBrk="0" hangingPunct="1">
+      <a:defRPr sz="1200" kern="1200">
+        <a:solidFill>
+          <a:schemeClr val="tx1"/>
+        </a:solidFill>
+        <a:latin typeface="+mn-lt"/>
+        <a:ea typeface="+mn-ea"/>
+        <a:cs typeface="+mn-cs"/>
+      </a:defRPr>
+    </a:lvl8pPr>
+    <a:lvl9pPr marL="3657600" algn="l" defTabSz="914400" rtl="0" eaLnBrk="1" latinLnBrk="0" hangingPunct="1">
+      <a:defRPr sz="1200" kern="1200">
+        <a:solidFill>
+          <a:schemeClr val="tx1"/>
+        </a:solidFill>
+        <a:latin typeface="+mn-lt"/>
+        <a:ea typeface="+mn-ea"/>
+        <a:cs typeface="+mn-cs"/>
+      </a:defRPr>
+    </a:lvl9pPr>
+  </p:notesStyle>
+</p:notesMaster>
 </file>
 
 <file path=ppt/slideLayouts/slideLayout1.xml><?xml version="1.0" encoding="utf-8"?>
@@ -266,7 +625,7 @@
           <a:p>
             <a:fld id="{92B3D0C1-4C55-4174-ACB6-FE14EF983A6D}" type="datetimeFigureOut">
               <a:rPr lang="de-CH" smtClean="0"/>
-              <a:t>02.10.2017</a:t>
+              <a:t>02.10.17</a:t>
             </a:fld>
             <a:endParaRPr lang="de-CH"/>
           </a:p>
@@ -328,7 +687,7 @@
           <a:p>
             <a:fld id="{216A1CAF-9D75-4D9A-A163-4634AE7ED004}" type="slidenum">
               <a:rPr lang="de-CH" smtClean="0"/>
-              <a:t>‹Nr.›</a:t>
+              <a:t>‹#›</a:t>
             </a:fld>
             <a:endParaRPr lang="de-CH"/>
           </a:p>
@@ -494,7 +853,7 @@
           <a:p>
             <a:fld id="{92B3D0C1-4C55-4174-ACB6-FE14EF983A6D}" type="datetimeFigureOut">
               <a:rPr lang="de-CH" smtClean="0"/>
-              <a:t>02.10.2017</a:t>
+              <a:t>02.10.17</a:t>
             </a:fld>
             <a:endParaRPr lang="de-CH"/>
           </a:p>
@@ -536,7 +895,7 @@
           <a:p>
             <a:fld id="{216A1CAF-9D75-4D9A-A163-4634AE7ED004}" type="slidenum">
               <a:rPr lang="de-CH" smtClean="0"/>
-              <a:t>‹Nr.›</a:t>
+              <a:t>‹#›</a:t>
             </a:fld>
             <a:endParaRPr lang="de-CH"/>
           </a:p>
@@ -674,7 +1033,7 @@
           <a:p>
             <a:fld id="{92B3D0C1-4C55-4174-ACB6-FE14EF983A6D}" type="datetimeFigureOut">
               <a:rPr lang="de-CH" smtClean="0"/>
-              <a:t>02.10.2017</a:t>
+              <a:t>02.10.17</a:t>
             </a:fld>
             <a:endParaRPr lang="de-CH"/>
           </a:p>
@@ -716,7 +1075,7 @@
           <a:p>
             <a:fld id="{216A1CAF-9D75-4D9A-A163-4634AE7ED004}" type="slidenum">
               <a:rPr lang="de-CH" smtClean="0"/>
-              <a:t>‹Nr.›</a:t>
+              <a:t>‹#›</a:t>
             </a:fld>
             <a:endParaRPr lang="de-CH"/>
           </a:p>
@@ -844,7 +1203,7 @@
           <a:p>
             <a:fld id="{92B3D0C1-4C55-4174-ACB6-FE14EF983A6D}" type="datetimeFigureOut">
               <a:rPr lang="de-CH" smtClean="0"/>
-              <a:t>02.10.2017</a:t>
+              <a:t>02.10.17</a:t>
             </a:fld>
             <a:endParaRPr lang="de-CH"/>
           </a:p>
@@ -886,7 +1245,7 @@
           <a:p>
             <a:fld id="{216A1CAF-9D75-4D9A-A163-4634AE7ED004}" type="slidenum">
               <a:rPr lang="de-CH" smtClean="0"/>
-              <a:t>‹Nr.›</a:t>
+              <a:t>‹#›</a:t>
             </a:fld>
             <a:endParaRPr lang="de-CH"/>
           </a:p>
@@ -1098,7 +1457,7 @@
           <a:p>
             <a:fld id="{92B3D0C1-4C55-4174-ACB6-FE14EF983A6D}" type="datetimeFigureOut">
               <a:rPr lang="de-CH" smtClean="0"/>
-              <a:t>02.10.2017</a:t>
+              <a:t>02.10.17</a:t>
             </a:fld>
             <a:endParaRPr lang="de-CH"/>
           </a:p>
@@ -1140,7 +1499,7 @@
           <a:p>
             <a:fld id="{216A1CAF-9D75-4D9A-A163-4634AE7ED004}" type="slidenum">
               <a:rPr lang="de-CH" smtClean="0"/>
-              <a:t>‹Nr.›</a:t>
+              <a:t>‹#›</a:t>
             </a:fld>
             <a:endParaRPr lang="de-CH"/>
           </a:p>
@@ -1424,7 +1783,7 @@
           <a:p>
             <a:fld id="{92B3D0C1-4C55-4174-ACB6-FE14EF983A6D}" type="datetimeFigureOut">
               <a:rPr lang="de-CH" smtClean="0"/>
-              <a:t>02.10.2017</a:t>
+              <a:t>02.10.17</a:t>
             </a:fld>
             <a:endParaRPr lang="de-CH"/>
           </a:p>
@@ -1466,7 +1825,7 @@
           <a:p>
             <a:fld id="{216A1CAF-9D75-4D9A-A163-4634AE7ED004}" type="slidenum">
               <a:rPr lang="de-CH" smtClean="0"/>
-              <a:t>‹Nr.›</a:t>
+              <a:t>‹#›</a:t>
             </a:fld>
             <a:endParaRPr lang="de-CH"/>
           </a:p>
@@ -1875,7 +2234,7 @@
           <a:p>
             <a:fld id="{92B3D0C1-4C55-4174-ACB6-FE14EF983A6D}" type="datetimeFigureOut">
               <a:rPr lang="de-CH" smtClean="0"/>
-              <a:t>02.10.2017</a:t>
+              <a:t>02.10.17</a:t>
             </a:fld>
             <a:endParaRPr lang="de-CH"/>
           </a:p>
@@ -1917,7 +2276,7 @@
           <a:p>
             <a:fld id="{216A1CAF-9D75-4D9A-A163-4634AE7ED004}" type="slidenum">
               <a:rPr lang="de-CH" smtClean="0"/>
-              <a:t>‹Nr.›</a:t>
+              <a:t>‹#›</a:t>
             </a:fld>
             <a:endParaRPr lang="de-CH"/>
           </a:p>
@@ -1993,7 +2352,7 @@
           <a:p>
             <a:fld id="{92B3D0C1-4C55-4174-ACB6-FE14EF983A6D}" type="datetimeFigureOut">
               <a:rPr lang="de-CH" smtClean="0"/>
-              <a:t>02.10.2017</a:t>
+              <a:t>02.10.17</a:t>
             </a:fld>
             <a:endParaRPr lang="de-CH"/>
           </a:p>
@@ -2035,7 +2394,7 @@
           <a:p>
             <a:fld id="{216A1CAF-9D75-4D9A-A163-4634AE7ED004}" type="slidenum">
               <a:rPr lang="de-CH" smtClean="0"/>
-              <a:t>‹Nr.›</a:t>
+              <a:t>‹#›</a:t>
             </a:fld>
             <a:endParaRPr lang="de-CH"/>
           </a:p>
@@ -2088,7 +2447,7 @@
           <a:p>
             <a:fld id="{92B3D0C1-4C55-4174-ACB6-FE14EF983A6D}" type="datetimeFigureOut">
               <a:rPr lang="de-CH" smtClean="0"/>
-              <a:t>02.10.2017</a:t>
+              <a:t>02.10.17</a:t>
             </a:fld>
             <a:endParaRPr lang="de-CH"/>
           </a:p>
@@ -2130,7 +2489,7 @@
           <a:p>
             <a:fld id="{216A1CAF-9D75-4D9A-A163-4634AE7ED004}" type="slidenum">
               <a:rPr lang="de-CH" smtClean="0"/>
-              <a:t>‹Nr.›</a:t>
+              <a:t>‹#›</a:t>
             </a:fld>
             <a:endParaRPr lang="de-CH"/>
           </a:p>
@@ -2375,7 +2734,7 @@
           <a:p>
             <a:fld id="{92B3D0C1-4C55-4174-ACB6-FE14EF983A6D}" type="datetimeFigureOut">
               <a:rPr lang="de-CH" smtClean="0"/>
-              <a:t>02.10.2017</a:t>
+              <a:t>02.10.17</a:t>
             </a:fld>
             <a:endParaRPr lang="de-CH"/>
           </a:p>
@@ -2417,7 +2776,7 @@
           <a:p>
             <a:fld id="{216A1CAF-9D75-4D9A-A163-4634AE7ED004}" type="slidenum">
               <a:rPr lang="de-CH" smtClean="0"/>
-              <a:t>‹Nr.›</a:t>
+              <a:t>‹#›</a:t>
             </a:fld>
             <a:endParaRPr lang="de-CH"/>
           </a:p>
@@ -2700,7 +3059,7 @@
           <a:p>
             <a:fld id="{92B3D0C1-4C55-4174-ACB6-FE14EF983A6D}" type="datetimeFigureOut">
               <a:rPr lang="de-CH" smtClean="0"/>
-              <a:t>02.10.2017</a:t>
+              <a:t>02.10.17</a:t>
             </a:fld>
             <a:endParaRPr lang="de-CH"/>
           </a:p>
@@ -2742,7 +3101,7 @@
           <a:p>
             <a:fld id="{216A1CAF-9D75-4D9A-A163-4634AE7ED004}" type="slidenum">
               <a:rPr lang="de-CH" smtClean="0"/>
-              <a:t>‹Nr.›</a:t>
+              <a:t>‹#›</a:t>
             </a:fld>
             <a:endParaRPr lang="de-CH"/>
           </a:p>
@@ -2954,7 +3313,7 @@
           <a:p>
             <a:fld id="{92B3D0C1-4C55-4174-ACB6-FE14EF983A6D}" type="datetimeFigureOut">
               <a:rPr lang="de-CH" smtClean="0"/>
-              <a:t>02.10.2017</a:t>
+              <a:t>02.10.17</a:t>
             </a:fld>
             <a:endParaRPr lang="de-CH"/>
           </a:p>
@@ -3036,7 +3395,7 @@
           <a:p>
             <a:fld id="{216A1CAF-9D75-4D9A-A163-4634AE7ED004}" type="slidenum">
               <a:rPr lang="de-CH" smtClean="0"/>
-              <a:t>‹Nr.›</a:t>
+              <a:t>‹#›</a:t>
             </a:fld>
             <a:endParaRPr lang="de-CH"/>
           </a:p>
@@ -4987,6 +5346,479 @@
 </p:sld>
 </file>
 
+<file path=ppt/slides/slide3.xml><?xml version="1.0" encoding="utf-8"?>
+<p:sld xmlns:a="http://schemas.openxmlformats.org/drawingml/2006/main" xmlns:r="http://schemas.openxmlformats.org/officeDocument/2006/relationships" xmlns:p="http://schemas.openxmlformats.org/presentationml/2006/main">
+  <p:cSld>
+    <p:spTree>
+      <p:nvGrpSpPr>
+        <p:cNvPr id="1" name=""/>
+        <p:cNvGrpSpPr/>
+        <p:nvPr/>
+      </p:nvGrpSpPr>
+      <p:grpSpPr>
+        <a:xfrm>
+          <a:off x="0" y="0"/>
+          <a:ext cx="0" cy="0"/>
+          <a:chOff x="0" y="0"/>
+          <a:chExt cx="0" cy="0"/>
+        </a:xfrm>
+      </p:grpSpPr>
+      <p:sp>
+        <p:nvSpPr>
+          <p:cNvPr id="2" name="Title 1"/>
+          <p:cNvSpPr>
+            <a:spLocks noGrp="1"/>
+          </p:cNvSpPr>
+          <p:nvPr>
+            <p:ph type="title"/>
+          </p:nvPr>
+        </p:nvSpPr>
+        <p:spPr/>
+        <p:txBody>
+          <a:bodyPr/>
+          <a:lstStyle/>
+          <a:p>
+            <a:r>
+              <a:rPr lang="en-US" dirty="0" smtClean="0"/>
+              <a:t>Tower Defense?</a:t>
+            </a:r>
+            <a:endParaRPr lang="en-US" dirty="0"/>
+          </a:p>
+        </p:txBody>
+      </p:sp>
+      <p:sp>
+        <p:nvSpPr>
+          <p:cNvPr id="3" name="Content Placeholder 2"/>
+          <p:cNvSpPr>
+            <a:spLocks noGrp="1"/>
+          </p:cNvSpPr>
+          <p:nvPr>
+            <p:ph idx="1"/>
+          </p:nvPr>
+        </p:nvSpPr>
+        <p:spPr>
+          <a:xfrm>
+            <a:off x="1261872" y="1828800"/>
+            <a:ext cx="8595360" cy="2501899"/>
+          </a:xfrm>
+        </p:spPr>
+        <p:txBody>
+          <a:bodyPr>
+            <a:normAutofit/>
+          </a:bodyPr>
+          <a:lstStyle/>
+          <a:p>
+            <a:r>
+              <a:rPr lang="en-US" dirty="0" smtClean="0"/>
+              <a:t>Subgenre of real-time or turn-based strategy video </a:t>
+            </a:r>
+            <a:br>
+              <a:rPr lang="en-US" dirty="0" smtClean="0"/>
+            </a:br>
+            <a:r>
+              <a:rPr lang="en-US" dirty="0" smtClean="0"/>
+              <a:t>games</a:t>
+            </a:r>
+          </a:p>
+          <a:p>
+            <a:r>
+              <a:rPr lang="en-US" dirty="0" smtClean="0"/>
+              <a:t>Goal: Defend your territories or possessions from </a:t>
+            </a:r>
+            <a:br>
+              <a:rPr lang="en-US" dirty="0" smtClean="0"/>
+            </a:br>
+            <a:r>
+              <a:rPr lang="en-US" dirty="0" smtClean="0"/>
+              <a:t>various enemies</a:t>
+            </a:r>
+          </a:p>
+          <a:p>
+            <a:r>
+              <a:rPr lang="en-US" dirty="0" smtClean="0"/>
+              <a:t>Achieved by building defensive structures to block, </a:t>
+            </a:r>
+            <a:br>
+              <a:rPr lang="en-US" dirty="0" smtClean="0"/>
+            </a:br>
+            <a:r>
+              <a:rPr lang="en-US" dirty="0" smtClean="0"/>
+              <a:t>impede or destroy enemies</a:t>
+            </a:r>
+          </a:p>
+        </p:txBody>
+      </p:sp>
+      <p:sp>
+        <p:nvSpPr>
+          <p:cNvPr id="4" name="Title 1"/>
+          <p:cNvSpPr txBox="1">
+            <a:spLocks/>
+          </p:cNvSpPr>
+          <p:nvPr/>
+        </p:nvSpPr>
+        <p:spPr>
+          <a:xfrm>
+            <a:off x="1261872" y="3845560"/>
+            <a:ext cx="9692640" cy="1325562"/>
+          </a:xfrm>
+          <a:prstGeom prst="rect">
+            <a:avLst/>
+          </a:prstGeom>
+        </p:spPr>
+        <p:txBody>
+          <a:bodyPr vert="horz" lIns="91440" tIns="45720" rIns="91440" bIns="45720" rtlCol="0" anchor="b">
+            <a:normAutofit/>
+          </a:bodyPr>
+          <a:lstStyle>
+            <a:lvl1pPr algn="l" defTabSz="914400" rtl="0" eaLnBrk="1" latinLnBrk="0" hangingPunct="1">
+              <a:lnSpc>
+                <a:spcPct val="90000"/>
+              </a:lnSpc>
+              <a:spcBef>
+                <a:spcPct val="0"/>
+              </a:spcBef>
+              <a:buNone/>
+              <a:defRPr sz="4400" kern="1200" spc="-50" baseline="0">
+                <a:solidFill>
+                  <a:schemeClr val="tx1"/>
+                </a:solidFill>
+                <a:latin typeface="+mj-lt"/>
+                <a:ea typeface="+mj-ea"/>
+                <a:cs typeface="+mj-cs"/>
+              </a:defRPr>
+            </a:lvl1pPr>
+          </a:lstStyle>
+          <a:p>
+            <a:r>
+              <a:rPr lang="en-US" dirty="0" smtClean="0"/>
+              <a:t>Origins</a:t>
+            </a:r>
+            <a:endParaRPr lang="en-US" dirty="0"/>
+          </a:p>
+        </p:txBody>
+      </p:sp>
+      <p:sp>
+        <p:nvSpPr>
+          <p:cNvPr id="5" name="Content Placeholder 2"/>
+          <p:cNvSpPr txBox="1">
+            <a:spLocks/>
+          </p:cNvSpPr>
+          <p:nvPr/>
+        </p:nvSpPr>
+        <p:spPr>
+          <a:xfrm>
+            <a:off x="1261872" y="5308601"/>
+            <a:ext cx="8595360" cy="1358900"/>
+          </a:xfrm>
+          <a:prstGeom prst="rect">
+            <a:avLst/>
+          </a:prstGeom>
+        </p:spPr>
+        <p:txBody>
+          <a:bodyPr vert="horz" lIns="91440" tIns="45720" rIns="91440" bIns="45720" rtlCol="0">
+            <a:normAutofit/>
+          </a:bodyPr>
+          <a:lstStyle>
+            <a:lvl1pPr marL="182880" indent="-182880" algn="l" defTabSz="914400" rtl="0" eaLnBrk="1" latinLnBrk="0" hangingPunct="1">
+              <a:lnSpc>
+                <a:spcPct val="95000"/>
+              </a:lnSpc>
+              <a:spcBef>
+                <a:spcPts val="1400"/>
+              </a:spcBef>
+              <a:spcAft>
+                <a:spcPts val="200"/>
+              </a:spcAft>
+              <a:buClr>
+                <a:schemeClr val="accent1"/>
+              </a:buClr>
+              <a:buSzPct val="80000"/>
+              <a:buFont typeface="Arial" pitchFamily="34" charset="0"/>
+              <a:buChar char="•"/>
+              <a:defRPr sz="1800" kern="1200" spc="10" baseline="0">
+                <a:solidFill>
+                  <a:schemeClr val="tx1"/>
+                </a:solidFill>
+                <a:latin typeface="+mn-lt"/>
+                <a:ea typeface="+mn-ea"/>
+                <a:cs typeface="+mn-cs"/>
+              </a:defRPr>
+            </a:lvl1pPr>
+            <a:lvl2pPr marL="457200" indent="-182880" algn="l" defTabSz="914400" rtl="0" eaLnBrk="1" latinLnBrk="0" hangingPunct="1">
+              <a:lnSpc>
+                <a:spcPct val="90000"/>
+              </a:lnSpc>
+              <a:spcBef>
+                <a:spcPts val="300"/>
+              </a:spcBef>
+              <a:spcAft>
+                <a:spcPts val="300"/>
+              </a:spcAft>
+              <a:buClr>
+                <a:schemeClr val="accent1"/>
+              </a:buClr>
+              <a:buFont typeface="Wingdings 2" pitchFamily="18" charset="2"/>
+              <a:buChar char=""/>
+              <a:defRPr sz="1600" kern="1200">
+                <a:solidFill>
+                  <a:schemeClr val="tx1">
+                    <a:lumMod val="85000"/>
+                    <a:lumOff val="15000"/>
+                  </a:schemeClr>
+                </a:solidFill>
+                <a:latin typeface="+mn-lt"/>
+                <a:ea typeface="+mn-ea"/>
+                <a:cs typeface="+mn-cs"/>
+              </a:defRPr>
+            </a:lvl2pPr>
+            <a:lvl3pPr marL="731520" indent="-182880" algn="l" defTabSz="914400" rtl="0" eaLnBrk="1" latinLnBrk="0" hangingPunct="1">
+              <a:lnSpc>
+                <a:spcPct val="90000"/>
+              </a:lnSpc>
+              <a:spcBef>
+                <a:spcPts val="300"/>
+              </a:spcBef>
+              <a:spcAft>
+                <a:spcPts val="300"/>
+              </a:spcAft>
+              <a:buClr>
+                <a:schemeClr val="accent1"/>
+              </a:buClr>
+              <a:buFont typeface="Wingdings 2" pitchFamily="18" charset="2"/>
+              <a:buChar char=""/>
+              <a:defRPr sz="1400" kern="1200">
+                <a:solidFill>
+                  <a:schemeClr val="tx1">
+                    <a:lumMod val="85000"/>
+                    <a:lumOff val="15000"/>
+                  </a:schemeClr>
+                </a:solidFill>
+                <a:latin typeface="+mn-lt"/>
+                <a:ea typeface="+mn-ea"/>
+                <a:cs typeface="+mn-cs"/>
+              </a:defRPr>
+            </a:lvl3pPr>
+            <a:lvl4pPr marL="1005840" indent="-182880" algn="l" defTabSz="914400" rtl="0" eaLnBrk="1" latinLnBrk="0" hangingPunct="1">
+              <a:lnSpc>
+                <a:spcPct val="90000"/>
+              </a:lnSpc>
+              <a:spcBef>
+                <a:spcPts val="300"/>
+              </a:spcBef>
+              <a:spcAft>
+                <a:spcPts val="300"/>
+              </a:spcAft>
+              <a:buClr>
+                <a:schemeClr val="accent1"/>
+              </a:buClr>
+              <a:buFont typeface="Wingdings 2" pitchFamily="18" charset="2"/>
+              <a:buChar char=""/>
+              <a:defRPr sz="1400" kern="1200">
+                <a:solidFill>
+                  <a:schemeClr val="tx1">
+                    <a:lumMod val="85000"/>
+                    <a:lumOff val="15000"/>
+                  </a:schemeClr>
+                </a:solidFill>
+                <a:latin typeface="+mn-lt"/>
+                <a:ea typeface="+mn-ea"/>
+                <a:cs typeface="+mn-cs"/>
+              </a:defRPr>
+            </a:lvl4pPr>
+            <a:lvl5pPr marL="1280160" indent="-182880" algn="l" defTabSz="914400" rtl="0" eaLnBrk="1" latinLnBrk="0" hangingPunct="1">
+              <a:lnSpc>
+                <a:spcPct val="90000"/>
+              </a:lnSpc>
+              <a:spcBef>
+                <a:spcPts val="300"/>
+              </a:spcBef>
+              <a:spcAft>
+                <a:spcPts val="300"/>
+              </a:spcAft>
+              <a:buClr>
+                <a:schemeClr val="accent1"/>
+              </a:buClr>
+              <a:buFont typeface="Wingdings 2" pitchFamily="18" charset="2"/>
+              <a:buChar char=""/>
+              <a:defRPr sz="1400" kern="1200">
+                <a:solidFill>
+                  <a:schemeClr val="tx1">
+                    <a:lumMod val="85000"/>
+                    <a:lumOff val="15000"/>
+                  </a:schemeClr>
+                </a:solidFill>
+                <a:latin typeface="+mn-lt"/>
+                <a:ea typeface="+mn-ea"/>
+                <a:cs typeface="+mn-cs"/>
+              </a:defRPr>
+            </a:lvl5pPr>
+            <a:lvl6pPr marL="1600000" indent="-228600" algn="l" defTabSz="914400" rtl="0" eaLnBrk="1" latinLnBrk="0" hangingPunct="1">
+              <a:lnSpc>
+                <a:spcPct val="90000"/>
+              </a:lnSpc>
+              <a:spcBef>
+                <a:spcPts val="300"/>
+              </a:spcBef>
+              <a:spcAft>
+                <a:spcPts val="300"/>
+              </a:spcAft>
+              <a:buClr>
+                <a:schemeClr val="accent1"/>
+              </a:buClr>
+              <a:buFont typeface="Wingdings 2" pitchFamily="18" charset="2"/>
+              <a:buChar char=""/>
+              <a:defRPr sz="1400" kern="1200">
+                <a:solidFill>
+                  <a:schemeClr val="tx1">
+                    <a:lumMod val="85000"/>
+                    <a:lumOff val="15000"/>
+                  </a:schemeClr>
+                </a:solidFill>
+                <a:latin typeface="+mn-lt"/>
+                <a:ea typeface="+mn-ea"/>
+                <a:cs typeface="+mn-cs"/>
+              </a:defRPr>
+            </a:lvl6pPr>
+            <a:lvl7pPr marL="1900000" indent="-228600" algn="l" defTabSz="914400" rtl="0" eaLnBrk="1" latinLnBrk="0" hangingPunct="1">
+              <a:lnSpc>
+                <a:spcPct val="90000"/>
+              </a:lnSpc>
+              <a:spcBef>
+                <a:spcPts val="300"/>
+              </a:spcBef>
+              <a:spcAft>
+                <a:spcPts val="300"/>
+              </a:spcAft>
+              <a:buClr>
+                <a:schemeClr val="accent1"/>
+              </a:buClr>
+              <a:buFont typeface="Wingdings 2" pitchFamily="18" charset="2"/>
+              <a:buChar char=""/>
+              <a:defRPr sz="1400" kern="1200">
+                <a:solidFill>
+                  <a:schemeClr val="tx1">
+                    <a:lumMod val="85000"/>
+                    <a:lumOff val="15000"/>
+                  </a:schemeClr>
+                </a:solidFill>
+                <a:latin typeface="+mn-lt"/>
+                <a:ea typeface="+mn-ea"/>
+                <a:cs typeface="+mn-cs"/>
+              </a:defRPr>
+            </a:lvl7pPr>
+            <a:lvl8pPr marL="2200000" indent="-228600" algn="l" defTabSz="914400" rtl="0" eaLnBrk="1" latinLnBrk="0" hangingPunct="1">
+              <a:lnSpc>
+                <a:spcPct val="90000"/>
+              </a:lnSpc>
+              <a:spcBef>
+                <a:spcPts val="300"/>
+              </a:spcBef>
+              <a:spcAft>
+                <a:spcPts val="300"/>
+              </a:spcAft>
+              <a:buClr>
+                <a:schemeClr val="accent1"/>
+              </a:buClr>
+              <a:buFont typeface="Wingdings 2" pitchFamily="18" charset="2"/>
+              <a:buChar char=""/>
+              <a:defRPr sz="1400" kern="1200">
+                <a:solidFill>
+                  <a:schemeClr val="tx1">
+                    <a:lumMod val="85000"/>
+                    <a:lumOff val="15000"/>
+                  </a:schemeClr>
+                </a:solidFill>
+                <a:latin typeface="+mn-lt"/>
+                <a:ea typeface="+mn-ea"/>
+                <a:cs typeface="+mn-cs"/>
+              </a:defRPr>
+            </a:lvl8pPr>
+            <a:lvl9pPr marL="2500000" indent="-228600" algn="l" defTabSz="914400" rtl="0" eaLnBrk="1" latinLnBrk="0" hangingPunct="1">
+              <a:lnSpc>
+                <a:spcPct val="90000"/>
+              </a:lnSpc>
+              <a:spcBef>
+                <a:spcPts val="300"/>
+              </a:spcBef>
+              <a:spcAft>
+                <a:spcPts val="300"/>
+              </a:spcAft>
+              <a:buClr>
+                <a:schemeClr val="accent1"/>
+              </a:buClr>
+              <a:buFont typeface="Wingdings 2" pitchFamily="18" charset="2"/>
+              <a:buChar char=""/>
+              <a:defRPr sz="1400" kern="1200">
+                <a:solidFill>
+                  <a:schemeClr val="tx1">
+                    <a:lumMod val="85000"/>
+                    <a:lumOff val="15000"/>
+                  </a:schemeClr>
+                </a:solidFill>
+                <a:latin typeface="+mn-lt"/>
+                <a:ea typeface="+mn-ea"/>
+                <a:cs typeface="+mn-cs"/>
+              </a:defRPr>
+            </a:lvl9pPr>
+          </a:lstStyle>
+          <a:p>
+            <a:r>
+              <a:rPr lang="en-US" dirty="0" smtClean="0"/>
+              <a:t>Precursors to TD such as Space Invaders in the 1980</a:t>
+            </a:r>
+          </a:p>
+          <a:p>
+            <a:r>
+              <a:rPr lang="en-US" dirty="0" smtClean="0"/>
+              <a:t>Boom with the emergence of smart phones in the late 2000s</a:t>
+            </a:r>
+            <a:endParaRPr lang="en-US" dirty="0" smtClean="0"/>
+          </a:p>
+        </p:txBody>
+      </p:sp>
+      <p:pic>
+        <p:nvPicPr>
+          <p:cNvPr id="6" name="Picture 5"/>
+          <p:cNvPicPr>
+            <a:picLocks noChangeAspect="1"/>
+          </p:cNvPicPr>
+          <p:nvPr/>
+        </p:nvPicPr>
+        <p:blipFill>
+          <a:blip r:embed="rId2">
+            <a:extLst>
+              <a:ext uri="{28A0092B-C50C-407E-A947-70E740481C1C}">
+                <a14:useLocalDpi xmlns:a14="http://schemas.microsoft.com/office/drawing/2010/main" val="0"/>
+              </a:ext>
+            </a:extLst>
+          </a:blip>
+          <a:stretch>
+            <a:fillRect/>
+          </a:stretch>
+        </p:blipFill>
+        <p:spPr>
+          <a:xfrm>
+            <a:off x="7366000" y="1574641"/>
+            <a:ext cx="3175000" cy="2387600"/>
+          </a:xfrm>
+          <a:prstGeom prst="rect">
+            <a:avLst/>
+          </a:prstGeom>
+        </p:spPr>
+      </p:pic>
+    </p:spTree>
+    <p:extLst>
+      <p:ext uri="{BB962C8B-B14F-4D97-AF65-F5344CB8AC3E}">
+        <p14:creationId xmlns:p14="http://schemas.microsoft.com/office/powerpoint/2010/main" val="89417333"/>
+      </p:ext>
+    </p:extLst>
+  </p:cSld>
+  <p:clrMapOvr>
+    <a:masterClrMapping/>
+  </p:clrMapOvr>
+</p:sld>
+</file>
+
 <file path=ppt/theme/theme1.xml><?xml version="1.0" encoding="utf-8"?>
 <a:theme xmlns:a="http://schemas.openxmlformats.org/drawingml/2006/main" name="View">
   <a:themeElements>
@@ -5238,4 +6070,265 @@
     </a:ext>
   </a:extLst>
 </a:theme>
+</file>
+
+<file path=ppt/theme/theme2.xml><?xml version="1.0" encoding="utf-8"?>
+<a:theme xmlns:a="http://schemas.openxmlformats.org/drawingml/2006/main" name="Office Theme">
+  <a:themeElements>
+    <a:clrScheme name="Office">
+      <a:dk1>
+        <a:sysClr val="windowText" lastClr="000000"/>
+      </a:dk1>
+      <a:lt1>
+        <a:sysClr val="window" lastClr="FFFFFF"/>
+      </a:lt1>
+      <a:dk2>
+        <a:srgbClr val="44546A"/>
+      </a:dk2>
+      <a:lt2>
+        <a:srgbClr val="E7E6E6"/>
+      </a:lt2>
+      <a:accent1>
+        <a:srgbClr val="4472C4"/>
+      </a:accent1>
+      <a:accent2>
+        <a:srgbClr val="ED7D31"/>
+      </a:accent2>
+      <a:accent3>
+        <a:srgbClr val="A5A5A5"/>
+      </a:accent3>
+      <a:accent4>
+        <a:srgbClr val="FFC000"/>
+      </a:accent4>
+      <a:accent5>
+        <a:srgbClr val="5B9BD5"/>
+      </a:accent5>
+      <a:accent6>
+        <a:srgbClr val="70AD47"/>
+      </a:accent6>
+      <a:hlink>
+        <a:srgbClr val="0563C1"/>
+      </a:hlink>
+      <a:folHlink>
+        <a:srgbClr val="954F72"/>
+      </a:folHlink>
+    </a:clrScheme>
+    <a:fontScheme name="Office">
+      <a:majorFont>
+        <a:latin typeface="Calibri Light" panose="020F0302020204030204"/>
+        <a:ea typeface=""/>
+        <a:cs typeface=""/>
+        <a:font script="Jpan" typeface="Yu Gothic Light"/>
+        <a:font script="Hang" typeface="맑은 고딕"/>
+        <a:font script="Hans" typeface="DengXian Light"/>
+        <a:font script="Hant" typeface="新細明體"/>
+        <a:font script="Arab" typeface="Times New Roman"/>
+        <a:font script="Hebr" typeface="Times New Roman"/>
+        <a:font script="Thai" typeface="Angsana New"/>
+        <a:font script="Ethi" typeface="Nyala"/>
+        <a:font script="Beng" typeface="Vrinda"/>
+        <a:font script="Gujr" typeface="Shruti"/>
+        <a:font script="Khmr" typeface="MoolBoran"/>
+        <a:font script="Knda" typeface="Tunga"/>
+        <a:font script="Guru" typeface="Raavi"/>
+        <a:font script="Cans" typeface="Euphemia"/>
+        <a:font script="Cher" typeface="Plantagenet Cherokee"/>
+        <a:font script="Yiii" typeface="Microsoft Yi Baiti"/>
+        <a:font script="Tibt" typeface="Microsoft Himalaya"/>
+        <a:font script="Thaa" typeface="MV Boli"/>
+        <a:font script="Deva" typeface="Mangal"/>
+        <a:font script="Telu" typeface="Gautami"/>
+        <a:font script="Taml" typeface="Latha"/>
+        <a:font script="Syrc" typeface="Estrangelo Edessa"/>
+        <a:font script="Orya" typeface="Kalinga"/>
+        <a:font script="Mlym" typeface="Kartika"/>
+        <a:font script="Laoo" typeface="DokChampa"/>
+        <a:font script="Sinh" typeface="Iskoola Pota"/>
+        <a:font script="Mong" typeface="Mongolian Baiti"/>
+        <a:font script="Viet" typeface="Times New Roman"/>
+        <a:font script="Uigh" typeface="Microsoft Uighur"/>
+        <a:font script="Geor" typeface="Sylfaen"/>
+      </a:majorFont>
+      <a:minorFont>
+        <a:latin typeface="Calibri" panose="020F0502020204030204"/>
+        <a:ea typeface=""/>
+        <a:cs typeface=""/>
+        <a:font script="Jpan" typeface="Yu Gothic"/>
+        <a:font script="Hang" typeface="맑은 고딕"/>
+        <a:font script="Hans" typeface="DengXian"/>
+        <a:font script="Hant" typeface="新細明體"/>
+        <a:font script="Arab" typeface="Arial"/>
+        <a:font script="Hebr" typeface="Arial"/>
+        <a:font script="Thai" typeface="Cordia New"/>
+        <a:font script="Ethi" typeface="Nyala"/>
+        <a:font script="Beng" typeface="Vrinda"/>
+        <a:font script="Gujr" typeface="Shruti"/>
+        <a:font script="Khmr" typeface="DaunPenh"/>
+        <a:font script="Knda" typeface="Tunga"/>
+        <a:font script="Guru" typeface="Raavi"/>
+        <a:font script="Cans" typeface="Euphemia"/>
+        <a:font script="Cher" typeface="Plantagenet Cherokee"/>
+        <a:font script="Yiii" typeface="Microsoft Yi Baiti"/>
+        <a:font script="Tibt" typeface="Microsoft Himalaya"/>
+        <a:font script="Thaa" typeface="MV Boli"/>
+        <a:font script="Deva" typeface="Mangal"/>
+        <a:font script="Telu" typeface="Gautami"/>
+        <a:font script="Taml" typeface="Latha"/>
+        <a:font script="Syrc" typeface="Estrangelo Edessa"/>
+        <a:font script="Orya" typeface="Kalinga"/>
+        <a:font script="Mlym" typeface="Kartika"/>
+        <a:font script="Laoo" typeface="DokChampa"/>
+        <a:font script="Sinh" typeface="Iskoola Pota"/>
+        <a:font script="Mong" typeface="Mongolian Baiti"/>
+        <a:font script="Viet" typeface="Arial"/>
+        <a:font script="Uigh" typeface="Microsoft Uighur"/>
+        <a:font script="Geor" typeface="Sylfaen"/>
+      </a:minorFont>
+    </a:fontScheme>
+    <a:fmtScheme name="Office">
+      <a:fillStyleLst>
+        <a:solidFill>
+          <a:schemeClr val="phClr"/>
+        </a:solidFill>
+        <a:gradFill rotWithShape="1">
+          <a:gsLst>
+            <a:gs pos="0">
+              <a:schemeClr val="phClr">
+                <a:lumMod val="110000"/>
+                <a:satMod val="105000"/>
+                <a:tint val="67000"/>
+              </a:schemeClr>
+            </a:gs>
+            <a:gs pos="50000">
+              <a:schemeClr val="phClr">
+                <a:lumMod val="105000"/>
+                <a:satMod val="103000"/>
+                <a:tint val="73000"/>
+              </a:schemeClr>
+            </a:gs>
+            <a:gs pos="100000">
+              <a:schemeClr val="phClr">
+                <a:lumMod val="105000"/>
+                <a:satMod val="109000"/>
+                <a:tint val="81000"/>
+              </a:schemeClr>
+            </a:gs>
+          </a:gsLst>
+          <a:lin ang="5400000" scaled="0"/>
+        </a:gradFill>
+        <a:gradFill rotWithShape="1">
+          <a:gsLst>
+            <a:gs pos="0">
+              <a:schemeClr val="phClr">
+                <a:satMod val="103000"/>
+                <a:lumMod val="102000"/>
+                <a:tint val="94000"/>
+              </a:schemeClr>
+            </a:gs>
+            <a:gs pos="50000">
+              <a:schemeClr val="phClr">
+                <a:satMod val="110000"/>
+                <a:lumMod val="100000"/>
+                <a:shade val="100000"/>
+              </a:schemeClr>
+            </a:gs>
+            <a:gs pos="100000">
+              <a:schemeClr val="phClr">
+                <a:lumMod val="99000"/>
+                <a:satMod val="120000"/>
+                <a:shade val="78000"/>
+              </a:schemeClr>
+            </a:gs>
+          </a:gsLst>
+          <a:lin ang="5400000" scaled="0"/>
+        </a:gradFill>
+      </a:fillStyleLst>
+      <a:lnStyleLst>
+        <a:ln w="6350" cap="flat" cmpd="sng" algn="ctr">
+          <a:solidFill>
+            <a:schemeClr val="phClr"/>
+          </a:solidFill>
+          <a:prstDash val="solid"/>
+          <a:miter lim="800000"/>
+        </a:ln>
+        <a:ln w="12700" cap="flat" cmpd="sng" algn="ctr">
+          <a:solidFill>
+            <a:schemeClr val="phClr"/>
+          </a:solidFill>
+          <a:prstDash val="solid"/>
+          <a:miter lim="800000"/>
+        </a:ln>
+        <a:ln w="19050" cap="flat" cmpd="sng" algn="ctr">
+          <a:solidFill>
+            <a:schemeClr val="phClr"/>
+          </a:solidFill>
+          <a:prstDash val="solid"/>
+          <a:miter lim="800000"/>
+        </a:ln>
+      </a:lnStyleLst>
+      <a:effectStyleLst>
+        <a:effectStyle>
+          <a:effectLst/>
+        </a:effectStyle>
+        <a:effectStyle>
+          <a:effectLst/>
+        </a:effectStyle>
+        <a:effectStyle>
+          <a:effectLst>
+            <a:outerShdw blurRad="57150" dist="19050" dir="5400000" algn="ctr" rotWithShape="0">
+              <a:srgbClr val="000000">
+                <a:alpha val="63000"/>
+              </a:srgbClr>
+            </a:outerShdw>
+          </a:effectLst>
+        </a:effectStyle>
+      </a:effectStyleLst>
+      <a:bgFillStyleLst>
+        <a:solidFill>
+          <a:schemeClr val="phClr"/>
+        </a:solidFill>
+        <a:solidFill>
+          <a:schemeClr val="phClr">
+            <a:tint val="95000"/>
+            <a:satMod val="170000"/>
+          </a:schemeClr>
+        </a:solidFill>
+        <a:gradFill rotWithShape="1">
+          <a:gsLst>
+            <a:gs pos="0">
+              <a:schemeClr val="phClr">
+                <a:tint val="93000"/>
+                <a:satMod val="150000"/>
+                <a:shade val="98000"/>
+                <a:lumMod val="102000"/>
+              </a:schemeClr>
+            </a:gs>
+            <a:gs pos="50000">
+              <a:schemeClr val="phClr">
+                <a:tint val="98000"/>
+                <a:satMod val="130000"/>
+                <a:shade val="90000"/>
+                <a:lumMod val="103000"/>
+              </a:schemeClr>
+            </a:gs>
+            <a:gs pos="100000">
+              <a:schemeClr val="phClr">
+                <a:shade val="63000"/>
+                <a:satMod val="120000"/>
+              </a:schemeClr>
+            </a:gs>
+          </a:gsLst>
+          <a:lin ang="5400000" scaled="0"/>
+        </a:gradFill>
+      </a:bgFillStyleLst>
+    </a:fmtScheme>
+  </a:themeElements>
+  <a:objectDefaults/>
+  <a:extraClrSchemeLst/>
+  <a:extLst>
+    <a:ext uri="{05A4C25C-085E-4340-85A3-A5531E510DB2}">
+      <thm15:themeFamily xmlns:thm15="http://schemas.microsoft.com/office/thememl/2012/main" name="Office Theme" id="{62F939B6-93AF-4DB8-9C6B-D6C7DFDC589F}" vid="{4A3C46E8-61CC-4603-A589-7422A47A8E4A}"/>
+    </a:ext>
+  </a:extLst>
+</a:theme>
 </file>
</xml_diff>

<commit_message>
Added some slides to presentation
</commit_message>
<xml_diff>
--- a/doc/Presentation.pptx
+++ b/doc/Presentation.pptx
@@ -5,12 +5,13 @@
     <p:sldMasterId id="2147483708" r:id="rId1"/>
   </p:sldMasterIdLst>
   <p:notesMasterIdLst>
-    <p:notesMasterId r:id="rId5"/>
+    <p:notesMasterId r:id="rId6"/>
   </p:notesMasterIdLst>
   <p:sldIdLst>
     <p:sldId id="256" r:id="rId2"/>
-    <p:sldId id="257" r:id="rId3"/>
-    <p:sldId id="258" r:id="rId4"/>
+    <p:sldId id="258" r:id="rId3"/>
+    <p:sldId id="257" r:id="rId4"/>
+    <p:sldId id="259" r:id="rId5"/>
   </p:sldIdLst>
   <p:sldSz cx="12192000" cy="6858000"/>
   <p:notesSz cx="6858000" cy="9144000"/>
@@ -3832,7 +3833,7 @@
         </p:blipFill>
         <p:spPr>
           <a:xfrm>
-            <a:off x="3475482" y="705678"/>
+            <a:off x="6632897" y="-91491"/>
             <a:ext cx="4991100" cy="4991100"/>
           </a:xfrm>
           <a:prstGeom prst="rect">
@@ -3918,6 +3919,476 @@
 </file>
 
 <file path=ppt/slides/slide2.xml><?xml version="1.0" encoding="utf-8"?>
+<p:sld xmlns:a="http://schemas.openxmlformats.org/drawingml/2006/main" xmlns:r="http://schemas.openxmlformats.org/officeDocument/2006/relationships" xmlns:p="http://schemas.openxmlformats.org/presentationml/2006/main">
+  <p:cSld>
+    <p:spTree>
+      <p:nvGrpSpPr>
+        <p:cNvPr id="1" name=""/>
+        <p:cNvGrpSpPr/>
+        <p:nvPr/>
+      </p:nvGrpSpPr>
+      <p:grpSpPr>
+        <a:xfrm>
+          <a:off x="0" y="0"/>
+          <a:ext cx="0" cy="0"/>
+          <a:chOff x="0" y="0"/>
+          <a:chExt cx="0" cy="0"/>
+        </a:xfrm>
+      </p:grpSpPr>
+      <p:sp>
+        <p:nvSpPr>
+          <p:cNvPr id="2" name="Title 1"/>
+          <p:cNvSpPr>
+            <a:spLocks noGrp="1"/>
+          </p:cNvSpPr>
+          <p:nvPr>
+            <p:ph type="title"/>
+          </p:nvPr>
+        </p:nvSpPr>
+        <p:spPr/>
+        <p:txBody>
+          <a:bodyPr/>
+          <a:lstStyle/>
+          <a:p>
+            <a:r>
+              <a:rPr lang="en-US" dirty="0"/>
+              <a:t>Tower Defense?</a:t>
+            </a:r>
+          </a:p>
+        </p:txBody>
+      </p:sp>
+      <p:sp>
+        <p:nvSpPr>
+          <p:cNvPr id="3" name="Content Placeholder 2"/>
+          <p:cNvSpPr>
+            <a:spLocks noGrp="1"/>
+          </p:cNvSpPr>
+          <p:nvPr>
+            <p:ph idx="1"/>
+          </p:nvPr>
+        </p:nvSpPr>
+        <p:spPr>
+          <a:xfrm>
+            <a:off x="1261872" y="1828800"/>
+            <a:ext cx="8595360" cy="2501899"/>
+          </a:xfrm>
+        </p:spPr>
+        <p:txBody>
+          <a:bodyPr>
+            <a:normAutofit/>
+          </a:bodyPr>
+          <a:lstStyle/>
+          <a:p>
+            <a:r>
+              <a:rPr lang="en-US" dirty="0"/>
+              <a:t>Subgenre of real-time or turn-based strategy video </a:t>
+            </a:r>
+            <a:br>
+              <a:rPr lang="en-US" dirty="0"/>
+            </a:br>
+            <a:r>
+              <a:rPr lang="en-US" dirty="0"/>
+              <a:t>games</a:t>
+            </a:r>
+          </a:p>
+          <a:p>
+            <a:r>
+              <a:rPr lang="en-US" dirty="0"/>
+              <a:t>Goal: Defend your territories or possessions from </a:t>
+            </a:r>
+            <a:br>
+              <a:rPr lang="en-US" dirty="0"/>
+            </a:br>
+            <a:r>
+              <a:rPr lang="en-US" dirty="0"/>
+              <a:t>various enemies</a:t>
+            </a:r>
+          </a:p>
+          <a:p>
+            <a:r>
+              <a:rPr lang="en-US" dirty="0"/>
+              <a:t>Achieved by building defensive structures to block, </a:t>
+            </a:r>
+            <a:br>
+              <a:rPr lang="en-US" dirty="0"/>
+            </a:br>
+            <a:r>
+              <a:rPr lang="en-US" dirty="0"/>
+              <a:t>impede or destroy enemies</a:t>
+            </a:r>
+          </a:p>
+        </p:txBody>
+      </p:sp>
+      <p:sp>
+        <p:nvSpPr>
+          <p:cNvPr id="4" name="Title 1"/>
+          <p:cNvSpPr txBox="1">
+            <a:spLocks/>
+          </p:cNvSpPr>
+          <p:nvPr/>
+        </p:nvSpPr>
+        <p:spPr>
+          <a:xfrm>
+            <a:off x="1261872" y="3845560"/>
+            <a:ext cx="9692640" cy="1325562"/>
+          </a:xfrm>
+          <a:prstGeom prst="rect">
+            <a:avLst/>
+          </a:prstGeom>
+        </p:spPr>
+        <p:txBody>
+          <a:bodyPr vert="horz" lIns="91440" tIns="45720" rIns="91440" bIns="45720" rtlCol="0" anchor="b">
+            <a:normAutofit/>
+          </a:bodyPr>
+          <a:lstStyle>
+            <a:lvl1pPr algn="l" defTabSz="914400" rtl="0" eaLnBrk="1" latinLnBrk="0" hangingPunct="1">
+              <a:lnSpc>
+                <a:spcPct val="90000"/>
+              </a:lnSpc>
+              <a:spcBef>
+                <a:spcPct val="0"/>
+              </a:spcBef>
+              <a:buNone/>
+              <a:defRPr sz="4400" kern="1200" spc="-50" baseline="0">
+                <a:solidFill>
+                  <a:schemeClr val="tx1"/>
+                </a:solidFill>
+                <a:latin typeface="+mj-lt"/>
+                <a:ea typeface="+mj-ea"/>
+                <a:cs typeface="+mj-cs"/>
+              </a:defRPr>
+            </a:lvl1pPr>
+          </a:lstStyle>
+          <a:p>
+            <a:r>
+              <a:rPr lang="en-US" dirty="0"/>
+              <a:t>Origins</a:t>
+            </a:r>
+          </a:p>
+        </p:txBody>
+      </p:sp>
+      <p:sp>
+        <p:nvSpPr>
+          <p:cNvPr id="5" name="Content Placeholder 2"/>
+          <p:cNvSpPr txBox="1">
+            <a:spLocks/>
+          </p:cNvSpPr>
+          <p:nvPr/>
+        </p:nvSpPr>
+        <p:spPr>
+          <a:xfrm>
+            <a:off x="1261872" y="5308601"/>
+            <a:ext cx="8595360" cy="1358900"/>
+          </a:xfrm>
+          <a:prstGeom prst="rect">
+            <a:avLst/>
+          </a:prstGeom>
+        </p:spPr>
+        <p:txBody>
+          <a:bodyPr vert="horz" lIns="91440" tIns="45720" rIns="91440" bIns="45720" rtlCol="0">
+            <a:normAutofit/>
+          </a:bodyPr>
+          <a:lstStyle>
+            <a:lvl1pPr marL="182880" indent="-182880" algn="l" defTabSz="914400" rtl="0" eaLnBrk="1" latinLnBrk="0" hangingPunct="1">
+              <a:lnSpc>
+                <a:spcPct val="95000"/>
+              </a:lnSpc>
+              <a:spcBef>
+                <a:spcPts val="1400"/>
+              </a:spcBef>
+              <a:spcAft>
+                <a:spcPts val="200"/>
+              </a:spcAft>
+              <a:buClr>
+                <a:schemeClr val="accent1"/>
+              </a:buClr>
+              <a:buSzPct val="80000"/>
+              <a:buFont typeface="Arial" pitchFamily="34" charset="0"/>
+              <a:buChar char="•"/>
+              <a:defRPr sz="1800" kern="1200" spc="10" baseline="0">
+                <a:solidFill>
+                  <a:schemeClr val="tx1"/>
+                </a:solidFill>
+                <a:latin typeface="+mn-lt"/>
+                <a:ea typeface="+mn-ea"/>
+                <a:cs typeface="+mn-cs"/>
+              </a:defRPr>
+            </a:lvl1pPr>
+            <a:lvl2pPr marL="457200" indent="-182880" algn="l" defTabSz="914400" rtl="0" eaLnBrk="1" latinLnBrk="0" hangingPunct="1">
+              <a:lnSpc>
+                <a:spcPct val="90000"/>
+              </a:lnSpc>
+              <a:spcBef>
+                <a:spcPts val="300"/>
+              </a:spcBef>
+              <a:spcAft>
+                <a:spcPts val="300"/>
+              </a:spcAft>
+              <a:buClr>
+                <a:schemeClr val="accent1"/>
+              </a:buClr>
+              <a:buFont typeface="Wingdings 2" pitchFamily="18" charset="2"/>
+              <a:buChar char=""/>
+              <a:defRPr sz="1600" kern="1200">
+                <a:solidFill>
+                  <a:schemeClr val="tx1">
+                    <a:lumMod val="85000"/>
+                    <a:lumOff val="15000"/>
+                  </a:schemeClr>
+                </a:solidFill>
+                <a:latin typeface="+mn-lt"/>
+                <a:ea typeface="+mn-ea"/>
+                <a:cs typeface="+mn-cs"/>
+              </a:defRPr>
+            </a:lvl2pPr>
+            <a:lvl3pPr marL="731520" indent="-182880" algn="l" defTabSz="914400" rtl="0" eaLnBrk="1" latinLnBrk="0" hangingPunct="1">
+              <a:lnSpc>
+                <a:spcPct val="90000"/>
+              </a:lnSpc>
+              <a:spcBef>
+                <a:spcPts val="300"/>
+              </a:spcBef>
+              <a:spcAft>
+                <a:spcPts val="300"/>
+              </a:spcAft>
+              <a:buClr>
+                <a:schemeClr val="accent1"/>
+              </a:buClr>
+              <a:buFont typeface="Wingdings 2" pitchFamily="18" charset="2"/>
+              <a:buChar char=""/>
+              <a:defRPr sz="1400" kern="1200">
+                <a:solidFill>
+                  <a:schemeClr val="tx1">
+                    <a:lumMod val="85000"/>
+                    <a:lumOff val="15000"/>
+                  </a:schemeClr>
+                </a:solidFill>
+                <a:latin typeface="+mn-lt"/>
+                <a:ea typeface="+mn-ea"/>
+                <a:cs typeface="+mn-cs"/>
+              </a:defRPr>
+            </a:lvl3pPr>
+            <a:lvl4pPr marL="1005840" indent="-182880" algn="l" defTabSz="914400" rtl="0" eaLnBrk="1" latinLnBrk="0" hangingPunct="1">
+              <a:lnSpc>
+                <a:spcPct val="90000"/>
+              </a:lnSpc>
+              <a:spcBef>
+                <a:spcPts val="300"/>
+              </a:spcBef>
+              <a:spcAft>
+                <a:spcPts val="300"/>
+              </a:spcAft>
+              <a:buClr>
+                <a:schemeClr val="accent1"/>
+              </a:buClr>
+              <a:buFont typeface="Wingdings 2" pitchFamily="18" charset="2"/>
+              <a:buChar char=""/>
+              <a:defRPr sz="1400" kern="1200">
+                <a:solidFill>
+                  <a:schemeClr val="tx1">
+                    <a:lumMod val="85000"/>
+                    <a:lumOff val="15000"/>
+                  </a:schemeClr>
+                </a:solidFill>
+                <a:latin typeface="+mn-lt"/>
+                <a:ea typeface="+mn-ea"/>
+                <a:cs typeface="+mn-cs"/>
+              </a:defRPr>
+            </a:lvl4pPr>
+            <a:lvl5pPr marL="1280160" indent="-182880" algn="l" defTabSz="914400" rtl="0" eaLnBrk="1" latinLnBrk="0" hangingPunct="1">
+              <a:lnSpc>
+                <a:spcPct val="90000"/>
+              </a:lnSpc>
+              <a:spcBef>
+                <a:spcPts val="300"/>
+              </a:spcBef>
+              <a:spcAft>
+                <a:spcPts val="300"/>
+              </a:spcAft>
+              <a:buClr>
+                <a:schemeClr val="accent1"/>
+              </a:buClr>
+              <a:buFont typeface="Wingdings 2" pitchFamily="18" charset="2"/>
+              <a:buChar char=""/>
+              <a:defRPr sz="1400" kern="1200">
+                <a:solidFill>
+                  <a:schemeClr val="tx1">
+                    <a:lumMod val="85000"/>
+                    <a:lumOff val="15000"/>
+                  </a:schemeClr>
+                </a:solidFill>
+                <a:latin typeface="+mn-lt"/>
+                <a:ea typeface="+mn-ea"/>
+                <a:cs typeface="+mn-cs"/>
+              </a:defRPr>
+            </a:lvl5pPr>
+            <a:lvl6pPr marL="1600000" indent="-228600" algn="l" defTabSz="914400" rtl="0" eaLnBrk="1" latinLnBrk="0" hangingPunct="1">
+              <a:lnSpc>
+                <a:spcPct val="90000"/>
+              </a:lnSpc>
+              <a:spcBef>
+                <a:spcPts val="300"/>
+              </a:spcBef>
+              <a:spcAft>
+                <a:spcPts val="300"/>
+              </a:spcAft>
+              <a:buClr>
+                <a:schemeClr val="accent1"/>
+              </a:buClr>
+              <a:buFont typeface="Wingdings 2" pitchFamily="18" charset="2"/>
+              <a:buChar char=""/>
+              <a:defRPr sz="1400" kern="1200">
+                <a:solidFill>
+                  <a:schemeClr val="tx1">
+                    <a:lumMod val="85000"/>
+                    <a:lumOff val="15000"/>
+                  </a:schemeClr>
+                </a:solidFill>
+                <a:latin typeface="+mn-lt"/>
+                <a:ea typeface="+mn-ea"/>
+                <a:cs typeface="+mn-cs"/>
+              </a:defRPr>
+            </a:lvl6pPr>
+            <a:lvl7pPr marL="1900000" indent="-228600" algn="l" defTabSz="914400" rtl="0" eaLnBrk="1" latinLnBrk="0" hangingPunct="1">
+              <a:lnSpc>
+                <a:spcPct val="90000"/>
+              </a:lnSpc>
+              <a:spcBef>
+                <a:spcPts val="300"/>
+              </a:spcBef>
+              <a:spcAft>
+                <a:spcPts val="300"/>
+              </a:spcAft>
+              <a:buClr>
+                <a:schemeClr val="accent1"/>
+              </a:buClr>
+              <a:buFont typeface="Wingdings 2" pitchFamily="18" charset="2"/>
+              <a:buChar char=""/>
+              <a:defRPr sz="1400" kern="1200">
+                <a:solidFill>
+                  <a:schemeClr val="tx1">
+                    <a:lumMod val="85000"/>
+                    <a:lumOff val="15000"/>
+                  </a:schemeClr>
+                </a:solidFill>
+                <a:latin typeface="+mn-lt"/>
+                <a:ea typeface="+mn-ea"/>
+                <a:cs typeface="+mn-cs"/>
+              </a:defRPr>
+            </a:lvl7pPr>
+            <a:lvl8pPr marL="2200000" indent="-228600" algn="l" defTabSz="914400" rtl="0" eaLnBrk="1" latinLnBrk="0" hangingPunct="1">
+              <a:lnSpc>
+                <a:spcPct val="90000"/>
+              </a:lnSpc>
+              <a:spcBef>
+                <a:spcPts val="300"/>
+              </a:spcBef>
+              <a:spcAft>
+                <a:spcPts val="300"/>
+              </a:spcAft>
+              <a:buClr>
+                <a:schemeClr val="accent1"/>
+              </a:buClr>
+              <a:buFont typeface="Wingdings 2" pitchFamily="18" charset="2"/>
+              <a:buChar char=""/>
+              <a:defRPr sz="1400" kern="1200">
+                <a:solidFill>
+                  <a:schemeClr val="tx1">
+                    <a:lumMod val="85000"/>
+                    <a:lumOff val="15000"/>
+                  </a:schemeClr>
+                </a:solidFill>
+                <a:latin typeface="+mn-lt"/>
+                <a:ea typeface="+mn-ea"/>
+                <a:cs typeface="+mn-cs"/>
+              </a:defRPr>
+            </a:lvl8pPr>
+            <a:lvl9pPr marL="2500000" indent="-228600" algn="l" defTabSz="914400" rtl="0" eaLnBrk="1" latinLnBrk="0" hangingPunct="1">
+              <a:lnSpc>
+                <a:spcPct val="90000"/>
+              </a:lnSpc>
+              <a:spcBef>
+                <a:spcPts val="300"/>
+              </a:spcBef>
+              <a:spcAft>
+                <a:spcPts val="300"/>
+              </a:spcAft>
+              <a:buClr>
+                <a:schemeClr val="accent1"/>
+              </a:buClr>
+              <a:buFont typeface="Wingdings 2" pitchFamily="18" charset="2"/>
+              <a:buChar char=""/>
+              <a:defRPr sz="1400" kern="1200">
+                <a:solidFill>
+                  <a:schemeClr val="tx1">
+                    <a:lumMod val="85000"/>
+                    <a:lumOff val="15000"/>
+                  </a:schemeClr>
+                </a:solidFill>
+                <a:latin typeface="+mn-lt"/>
+                <a:ea typeface="+mn-ea"/>
+                <a:cs typeface="+mn-cs"/>
+              </a:defRPr>
+            </a:lvl9pPr>
+          </a:lstStyle>
+          <a:p>
+            <a:r>
+              <a:rPr lang="en-US" dirty="0"/>
+              <a:t>Precursors to TD such as Space Invaders in the 1980</a:t>
+            </a:r>
+          </a:p>
+          <a:p>
+            <a:r>
+              <a:rPr lang="en-US" dirty="0"/>
+              <a:t>Boom with the emergence of smart phones in the late 2000s</a:t>
+            </a:r>
+          </a:p>
+        </p:txBody>
+      </p:sp>
+      <p:pic>
+        <p:nvPicPr>
+          <p:cNvPr id="6" name="Picture 5"/>
+          <p:cNvPicPr>
+            <a:picLocks noChangeAspect="1"/>
+          </p:cNvPicPr>
+          <p:nvPr/>
+        </p:nvPicPr>
+        <p:blipFill>
+          <a:blip r:embed="rId2">
+            <a:extLst>
+              <a:ext uri="{28A0092B-C50C-407E-A947-70E740481C1C}">
+                <a14:useLocalDpi xmlns:a14="http://schemas.microsoft.com/office/drawing/2010/main" val="0"/>
+              </a:ext>
+            </a:extLst>
+          </a:blip>
+          <a:stretch>
+            <a:fillRect/>
+          </a:stretch>
+        </p:blipFill>
+        <p:spPr>
+          <a:xfrm>
+            <a:off x="7366000" y="1574641"/>
+            <a:ext cx="3175000" cy="2387600"/>
+          </a:xfrm>
+          <a:prstGeom prst="rect">
+            <a:avLst/>
+          </a:prstGeom>
+        </p:spPr>
+      </p:pic>
+    </p:spTree>
+    <p:extLst>
+      <p:ext uri="{BB962C8B-B14F-4D97-AF65-F5344CB8AC3E}">
+        <p14:creationId xmlns:p14="http://schemas.microsoft.com/office/powerpoint/2010/main" val="89417333"/>
+      </p:ext>
+    </p:extLst>
+  </p:cSld>
+  <p:clrMapOvr>
+    <a:masterClrMapping/>
+  </p:clrMapOvr>
+</p:sld>
+</file>
+
+<file path=ppt/slides/slide3.xml><?xml version="1.0" encoding="utf-8"?>
 <p:sld xmlns:a="http://schemas.openxmlformats.org/drawingml/2006/main" xmlns:r="http://schemas.openxmlformats.org/officeDocument/2006/relationships" xmlns:p="http://schemas.openxmlformats.org/presentationml/2006/main">
   <p:cSld>
     <p:spTree>
@@ -4199,28 +4670,8 @@
           <a:lstStyle/>
           <a:p>
             <a:r>
-              <a:rPr lang="de-CH" dirty="0" err="1"/>
-              <a:t>What</a:t>
-            </a:r>
-            <a:r>
               <a:rPr lang="de-CH" dirty="0"/>
-              <a:t>, </a:t>
-            </a:r>
-            <a:r>
-              <a:rPr lang="de-CH" dirty="0" err="1"/>
-              <a:t>Why</a:t>
-            </a:r>
-            <a:r>
-              <a:rPr lang="de-CH" dirty="0"/>
-              <a:t> </a:t>
-            </a:r>
-            <a:r>
-              <a:rPr lang="de-CH" dirty="0" err="1"/>
-              <a:t>and</a:t>
-            </a:r>
-            <a:r>
-              <a:rPr lang="de-CH" dirty="0"/>
-              <a:t> </a:t>
+              <a:t>And </a:t>
             </a:r>
             <a:r>
               <a:rPr lang="de-CH" dirty="0" err="1"/>
@@ -4250,70 +4701,24 @@
           <a:p>
             <a:r>
               <a:rPr lang="de-CH" dirty="0"/>
-              <a:t>Tower </a:t>
+              <a:t>Multi-</a:t>
             </a:r>
             <a:r>
               <a:rPr lang="de-CH" dirty="0" err="1"/>
-              <a:t>defense</a:t>
-            </a:r>
+              <a:t>layered</a:t>
+            </a:r>
+            <a:endParaRPr lang="de-CH" dirty="0"/>
+          </a:p>
+          <a:p>
             <a:r>
               <a:rPr lang="de-CH" dirty="0"/>
-              <a:t> </a:t>
+              <a:t>Custom </a:t>
             </a:r>
             <a:r>
               <a:rPr lang="de-CH" dirty="0" err="1"/>
-              <a:t>game</a:t>
+              <a:t>maps</a:t>
             </a:r>
             <a:endParaRPr lang="de-CH" dirty="0"/>
-          </a:p>
-          <a:p>
-            <a:r>
-              <a:rPr lang="de-CH" dirty="0" err="1"/>
-              <a:t>Because</a:t>
-            </a:r>
-            <a:r>
-              <a:rPr lang="de-CH" dirty="0"/>
-              <a:t> </a:t>
-            </a:r>
-            <a:r>
-              <a:rPr lang="de-CH" dirty="0" err="1"/>
-              <a:t>we</a:t>
-            </a:r>
-            <a:r>
-              <a:rPr lang="de-CH" dirty="0"/>
-              <a:t> </a:t>
-            </a:r>
-            <a:r>
-              <a:rPr lang="de-CH" dirty="0" err="1"/>
-              <a:t>can</a:t>
-            </a:r>
-            <a:endParaRPr lang="de-CH" dirty="0"/>
-          </a:p>
-          <a:p>
-            <a:r>
-              <a:rPr lang="de-CH" dirty="0" err="1"/>
-              <a:t>We</a:t>
-            </a:r>
-            <a:r>
-              <a:rPr lang="de-CH" dirty="0"/>
-              <a:t> </a:t>
-            </a:r>
-            <a:r>
-              <a:rPr lang="de-CH" dirty="0" err="1"/>
-              <a:t>want</a:t>
-            </a:r>
-            <a:r>
-              <a:rPr lang="de-CH" dirty="0"/>
-              <a:t> </a:t>
-            </a:r>
-            <a:r>
-              <a:rPr lang="de-CH" dirty="0" err="1"/>
-              <a:t>this</a:t>
-            </a:r>
-            <a:r>
-              <a:rPr lang="de-CH" dirty="0"/>
-              <a:t>:</a:t>
-            </a:r>
           </a:p>
         </p:txBody>
       </p:sp>
@@ -5367,7 +5772,7 @@
 </p:sld>
 </file>
 
-<file path=ppt/slides/slide3.xml><?xml version="1.0" encoding="utf-8"?>
+<file path=ppt/slides/slide4.xml><?xml version="1.0" encoding="utf-8"?>
 <p:sld xmlns:a="http://schemas.openxmlformats.org/drawingml/2006/main" xmlns:r="http://schemas.openxmlformats.org/officeDocument/2006/relationships" xmlns:p="http://schemas.openxmlformats.org/presentationml/2006/main">
   <p:cSld>
     <p:spTree>
@@ -5384,426 +5789,22 @@
           <a:chExt cx="0" cy="0"/>
         </a:xfrm>
       </p:grpSpPr>
-      <p:sp>
-        <p:nvSpPr>
-          <p:cNvPr id="2" name="Title 1"/>
-          <p:cNvSpPr>
-            <a:spLocks noGrp="1"/>
-          </p:cNvSpPr>
-          <p:nvPr>
-            <p:ph type="title"/>
-          </p:nvPr>
-        </p:nvSpPr>
-        <p:spPr/>
-        <p:txBody>
-          <a:bodyPr/>
-          <a:lstStyle/>
-          <a:p>
-            <a:r>
-              <a:rPr lang="en-US" dirty="0"/>
-              <a:t>Tower Defense?</a:t>
-            </a:r>
-          </a:p>
-        </p:txBody>
-      </p:sp>
-      <p:sp>
-        <p:nvSpPr>
-          <p:cNvPr id="3" name="Content Placeholder 2"/>
-          <p:cNvSpPr>
-            <a:spLocks noGrp="1"/>
-          </p:cNvSpPr>
-          <p:nvPr>
-            <p:ph idx="1"/>
-          </p:nvPr>
-        </p:nvSpPr>
-        <p:spPr>
-          <a:xfrm>
-            <a:off x="1261872" y="1828800"/>
-            <a:ext cx="8595360" cy="2501899"/>
-          </a:xfrm>
-        </p:spPr>
-        <p:txBody>
-          <a:bodyPr>
-            <a:normAutofit/>
-          </a:bodyPr>
-          <a:lstStyle/>
-          <a:p>
-            <a:r>
-              <a:rPr lang="en-US" dirty="0"/>
-              <a:t>Subgenre of real-time or turn-based strategy video </a:t>
-            </a:r>
-            <a:br>
-              <a:rPr lang="en-US" dirty="0"/>
-            </a:br>
-            <a:r>
-              <a:rPr lang="en-US" dirty="0"/>
-              <a:t>games</a:t>
-            </a:r>
-          </a:p>
-          <a:p>
-            <a:r>
-              <a:rPr lang="en-US" dirty="0"/>
-              <a:t>Goal: Defend your territories or possessions from </a:t>
-            </a:r>
-            <a:br>
-              <a:rPr lang="en-US" dirty="0"/>
-            </a:br>
-            <a:r>
-              <a:rPr lang="en-US" dirty="0"/>
-              <a:t>various enemies</a:t>
-            </a:r>
-          </a:p>
-          <a:p>
-            <a:r>
-              <a:rPr lang="en-US" dirty="0"/>
-              <a:t>Achieved by building defensive structures to block, </a:t>
-            </a:r>
-            <a:br>
-              <a:rPr lang="en-US" dirty="0"/>
-            </a:br>
-            <a:r>
-              <a:rPr lang="en-US" dirty="0"/>
-              <a:t>impede or destroy enemies</a:t>
-            </a:r>
-          </a:p>
-        </p:txBody>
-      </p:sp>
-      <p:sp>
-        <p:nvSpPr>
-          <p:cNvPr id="4" name="Title 1"/>
-          <p:cNvSpPr txBox="1">
-            <a:spLocks/>
-          </p:cNvSpPr>
-          <p:nvPr/>
-        </p:nvSpPr>
-        <p:spPr>
-          <a:xfrm>
-            <a:off x="1261872" y="3845560"/>
-            <a:ext cx="9692640" cy="1325562"/>
-          </a:xfrm>
-          <a:prstGeom prst="rect">
-            <a:avLst/>
-          </a:prstGeom>
-        </p:spPr>
-        <p:txBody>
-          <a:bodyPr vert="horz" lIns="91440" tIns="45720" rIns="91440" bIns="45720" rtlCol="0" anchor="b">
-            <a:normAutofit/>
-          </a:bodyPr>
-          <a:lstStyle>
-            <a:lvl1pPr algn="l" defTabSz="914400" rtl="0" eaLnBrk="1" latinLnBrk="0" hangingPunct="1">
-              <a:lnSpc>
-                <a:spcPct val="90000"/>
-              </a:lnSpc>
-              <a:spcBef>
-                <a:spcPct val="0"/>
-              </a:spcBef>
-              <a:buNone/>
-              <a:defRPr sz="4400" kern="1200" spc="-50" baseline="0">
-                <a:solidFill>
-                  <a:schemeClr val="tx1"/>
-                </a:solidFill>
-                <a:latin typeface="+mj-lt"/>
-                <a:ea typeface="+mj-ea"/>
-                <a:cs typeface="+mj-cs"/>
-              </a:defRPr>
-            </a:lvl1pPr>
-          </a:lstStyle>
-          <a:p>
-            <a:r>
-              <a:rPr lang="en-US" dirty="0"/>
-              <a:t>Origins</a:t>
-            </a:r>
-          </a:p>
-        </p:txBody>
-      </p:sp>
-      <p:sp>
-        <p:nvSpPr>
-          <p:cNvPr id="5" name="Content Placeholder 2"/>
-          <p:cNvSpPr txBox="1">
-            <a:spLocks/>
-          </p:cNvSpPr>
-          <p:nvPr/>
-        </p:nvSpPr>
-        <p:spPr>
-          <a:xfrm>
-            <a:off x="1261872" y="5308601"/>
-            <a:ext cx="8595360" cy="1358900"/>
-          </a:xfrm>
-          <a:prstGeom prst="rect">
-            <a:avLst/>
-          </a:prstGeom>
-        </p:spPr>
-        <p:txBody>
-          <a:bodyPr vert="horz" lIns="91440" tIns="45720" rIns="91440" bIns="45720" rtlCol="0">
-            <a:normAutofit/>
-          </a:bodyPr>
-          <a:lstStyle>
-            <a:lvl1pPr marL="182880" indent="-182880" algn="l" defTabSz="914400" rtl="0" eaLnBrk="1" latinLnBrk="0" hangingPunct="1">
-              <a:lnSpc>
-                <a:spcPct val="95000"/>
-              </a:lnSpc>
-              <a:spcBef>
-                <a:spcPts val="1400"/>
-              </a:spcBef>
-              <a:spcAft>
-                <a:spcPts val="200"/>
-              </a:spcAft>
-              <a:buClr>
-                <a:schemeClr val="accent1"/>
-              </a:buClr>
-              <a:buSzPct val="80000"/>
-              <a:buFont typeface="Arial" pitchFamily="34" charset="0"/>
-              <a:buChar char="•"/>
-              <a:defRPr sz="1800" kern="1200" spc="10" baseline="0">
-                <a:solidFill>
-                  <a:schemeClr val="tx1"/>
-                </a:solidFill>
-                <a:latin typeface="+mn-lt"/>
-                <a:ea typeface="+mn-ea"/>
-                <a:cs typeface="+mn-cs"/>
-              </a:defRPr>
-            </a:lvl1pPr>
-            <a:lvl2pPr marL="457200" indent="-182880" algn="l" defTabSz="914400" rtl="0" eaLnBrk="1" latinLnBrk="0" hangingPunct="1">
-              <a:lnSpc>
-                <a:spcPct val="90000"/>
-              </a:lnSpc>
-              <a:spcBef>
-                <a:spcPts val="300"/>
-              </a:spcBef>
-              <a:spcAft>
-                <a:spcPts val="300"/>
-              </a:spcAft>
-              <a:buClr>
-                <a:schemeClr val="accent1"/>
-              </a:buClr>
-              <a:buFont typeface="Wingdings 2" pitchFamily="18" charset="2"/>
-              <a:buChar char=""/>
-              <a:defRPr sz="1600" kern="1200">
-                <a:solidFill>
-                  <a:schemeClr val="tx1">
-                    <a:lumMod val="85000"/>
-                    <a:lumOff val="15000"/>
-                  </a:schemeClr>
-                </a:solidFill>
-                <a:latin typeface="+mn-lt"/>
-                <a:ea typeface="+mn-ea"/>
-                <a:cs typeface="+mn-cs"/>
-              </a:defRPr>
-            </a:lvl2pPr>
-            <a:lvl3pPr marL="731520" indent="-182880" algn="l" defTabSz="914400" rtl="0" eaLnBrk="1" latinLnBrk="0" hangingPunct="1">
-              <a:lnSpc>
-                <a:spcPct val="90000"/>
-              </a:lnSpc>
-              <a:spcBef>
-                <a:spcPts val="300"/>
-              </a:spcBef>
-              <a:spcAft>
-                <a:spcPts val="300"/>
-              </a:spcAft>
-              <a:buClr>
-                <a:schemeClr val="accent1"/>
-              </a:buClr>
-              <a:buFont typeface="Wingdings 2" pitchFamily="18" charset="2"/>
-              <a:buChar char=""/>
-              <a:defRPr sz="1400" kern="1200">
-                <a:solidFill>
-                  <a:schemeClr val="tx1">
-                    <a:lumMod val="85000"/>
-                    <a:lumOff val="15000"/>
-                  </a:schemeClr>
-                </a:solidFill>
-                <a:latin typeface="+mn-lt"/>
-                <a:ea typeface="+mn-ea"/>
-                <a:cs typeface="+mn-cs"/>
-              </a:defRPr>
-            </a:lvl3pPr>
-            <a:lvl4pPr marL="1005840" indent="-182880" algn="l" defTabSz="914400" rtl="0" eaLnBrk="1" latinLnBrk="0" hangingPunct="1">
-              <a:lnSpc>
-                <a:spcPct val="90000"/>
-              </a:lnSpc>
-              <a:spcBef>
-                <a:spcPts val="300"/>
-              </a:spcBef>
-              <a:spcAft>
-                <a:spcPts val="300"/>
-              </a:spcAft>
-              <a:buClr>
-                <a:schemeClr val="accent1"/>
-              </a:buClr>
-              <a:buFont typeface="Wingdings 2" pitchFamily="18" charset="2"/>
-              <a:buChar char=""/>
-              <a:defRPr sz="1400" kern="1200">
-                <a:solidFill>
-                  <a:schemeClr val="tx1">
-                    <a:lumMod val="85000"/>
-                    <a:lumOff val="15000"/>
-                  </a:schemeClr>
-                </a:solidFill>
-                <a:latin typeface="+mn-lt"/>
-                <a:ea typeface="+mn-ea"/>
-                <a:cs typeface="+mn-cs"/>
-              </a:defRPr>
-            </a:lvl4pPr>
-            <a:lvl5pPr marL="1280160" indent="-182880" algn="l" defTabSz="914400" rtl="0" eaLnBrk="1" latinLnBrk="0" hangingPunct="1">
-              <a:lnSpc>
-                <a:spcPct val="90000"/>
-              </a:lnSpc>
-              <a:spcBef>
-                <a:spcPts val="300"/>
-              </a:spcBef>
-              <a:spcAft>
-                <a:spcPts val="300"/>
-              </a:spcAft>
-              <a:buClr>
-                <a:schemeClr val="accent1"/>
-              </a:buClr>
-              <a:buFont typeface="Wingdings 2" pitchFamily="18" charset="2"/>
-              <a:buChar char=""/>
-              <a:defRPr sz="1400" kern="1200">
-                <a:solidFill>
-                  <a:schemeClr val="tx1">
-                    <a:lumMod val="85000"/>
-                    <a:lumOff val="15000"/>
-                  </a:schemeClr>
-                </a:solidFill>
-                <a:latin typeface="+mn-lt"/>
-                <a:ea typeface="+mn-ea"/>
-                <a:cs typeface="+mn-cs"/>
-              </a:defRPr>
-            </a:lvl5pPr>
-            <a:lvl6pPr marL="1600000" indent="-228600" algn="l" defTabSz="914400" rtl="0" eaLnBrk="1" latinLnBrk="0" hangingPunct="1">
-              <a:lnSpc>
-                <a:spcPct val="90000"/>
-              </a:lnSpc>
-              <a:spcBef>
-                <a:spcPts val="300"/>
-              </a:spcBef>
-              <a:spcAft>
-                <a:spcPts val="300"/>
-              </a:spcAft>
-              <a:buClr>
-                <a:schemeClr val="accent1"/>
-              </a:buClr>
-              <a:buFont typeface="Wingdings 2" pitchFamily="18" charset="2"/>
-              <a:buChar char=""/>
-              <a:defRPr sz="1400" kern="1200">
-                <a:solidFill>
-                  <a:schemeClr val="tx1">
-                    <a:lumMod val="85000"/>
-                    <a:lumOff val="15000"/>
-                  </a:schemeClr>
-                </a:solidFill>
-                <a:latin typeface="+mn-lt"/>
-                <a:ea typeface="+mn-ea"/>
-                <a:cs typeface="+mn-cs"/>
-              </a:defRPr>
-            </a:lvl6pPr>
-            <a:lvl7pPr marL="1900000" indent="-228600" algn="l" defTabSz="914400" rtl="0" eaLnBrk="1" latinLnBrk="0" hangingPunct="1">
-              <a:lnSpc>
-                <a:spcPct val="90000"/>
-              </a:lnSpc>
-              <a:spcBef>
-                <a:spcPts val="300"/>
-              </a:spcBef>
-              <a:spcAft>
-                <a:spcPts val="300"/>
-              </a:spcAft>
-              <a:buClr>
-                <a:schemeClr val="accent1"/>
-              </a:buClr>
-              <a:buFont typeface="Wingdings 2" pitchFamily="18" charset="2"/>
-              <a:buChar char=""/>
-              <a:defRPr sz="1400" kern="1200">
-                <a:solidFill>
-                  <a:schemeClr val="tx1">
-                    <a:lumMod val="85000"/>
-                    <a:lumOff val="15000"/>
-                  </a:schemeClr>
-                </a:solidFill>
-                <a:latin typeface="+mn-lt"/>
-                <a:ea typeface="+mn-ea"/>
-                <a:cs typeface="+mn-cs"/>
-              </a:defRPr>
-            </a:lvl7pPr>
-            <a:lvl8pPr marL="2200000" indent="-228600" algn="l" defTabSz="914400" rtl="0" eaLnBrk="1" latinLnBrk="0" hangingPunct="1">
-              <a:lnSpc>
-                <a:spcPct val="90000"/>
-              </a:lnSpc>
-              <a:spcBef>
-                <a:spcPts val="300"/>
-              </a:spcBef>
-              <a:spcAft>
-                <a:spcPts val="300"/>
-              </a:spcAft>
-              <a:buClr>
-                <a:schemeClr val="accent1"/>
-              </a:buClr>
-              <a:buFont typeface="Wingdings 2" pitchFamily="18" charset="2"/>
-              <a:buChar char=""/>
-              <a:defRPr sz="1400" kern="1200">
-                <a:solidFill>
-                  <a:schemeClr val="tx1">
-                    <a:lumMod val="85000"/>
-                    <a:lumOff val="15000"/>
-                  </a:schemeClr>
-                </a:solidFill>
-                <a:latin typeface="+mn-lt"/>
-                <a:ea typeface="+mn-ea"/>
-                <a:cs typeface="+mn-cs"/>
-              </a:defRPr>
-            </a:lvl8pPr>
-            <a:lvl9pPr marL="2500000" indent="-228600" algn="l" defTabSz="914400" rtl="0" eaLnBrk="1" latinLnBrk="0" hangingPunct="1">
-              <a:lnSpc>
-                <a:spcPct val="90000"/>
-              </a:lnSpc>
-              <a:spcBef>
-                <a:spcPts val="300"/>
-              </a:spcBef>
-              <a:spcAft>
-                <a:spcPts val="300"/>
-              </a:spcAft>
-              <a:buClr>
-                <a:schemeClr val="accent1"/>
-              </a:buClr>
-              <a:buFont typeface="Wingdings 2" pitchFamily="18" charset="2"/>
-              <a:buChar char=""/>
-              <a:defRPr sz="1400" kern="1200">
-                <a:solidFill>
-                  <a:schemeClr val="tx1">
-                    <a:lumMod val="85000"/>
-                    <a:lumOff val="15000"/>
-                  </a:schemeClr>
-                </a:solidFill>
-                <a:latin typeface="+mn-lt"/>
-                <a:ea typeface="+mn-ea"/>
-                <a:cs typeface="+mn-cs"/>
-              </a:defRPr>
-            </a:lvl9pPr>
-          </a:lstStyle>
-          <a:p>
-            <a:r>
-              <a:rPr lang="en-US" dirty="0"/>
-              <a:t>Precursors to TD such as Space Invaders in the 1980</a:t>
-            </a:r>
-          </a:p>
-          <a:p>
-            <a:r>
-              <a:rPr lang="en-US" dirty="0"/>
-              <a:t>Boom with the emergence of smart phones in the late 2000s</a:t>
-            </a:r>
-          </a:p>
-        </p:txBody>
-      </p:sp>
       <p:pic>
         <p:nvPicPr>
-          <p:cNvPr id="6" name="Picture 5"/>
+          <p:cNvPr id="5" name="Grafik 4">
+            <a:extLst>
+              <a:ext uri="{FF2B5EF4-FFF2-40B4-BE49-F238E27FC236}">
+                <a16:creationId xmlns:a16="http://schemas.microsoft.com/office/drawing/2014/main" id="{3CCF4D3B-7A0F-4753-9950-8C3AFE3346D9}"/>
+              </a:ext>
+            </a:extLst>
+          </p:cNvPr>
           <p:cNvPicPr>
             <a:picLocks noChangeAspect="1"/>
           </p:cNvPicPr>
           <p:nvPr/>
         </p:nvPicPr>
         <p:blipFill>
-          <a:blip r:embed="rId2">
+          <a:blip r:embed="rId2" cstate="print">
             <a:extLst>
               <a:ext uri="{28A0092B-C50C-407E-A947-70E740481C1C}">
                 <a14:useLocalDpi xmlns:a14="http://schemas.microsoft.com/office/drawing/2010/main" val="0"/>
@@ -5816,18 +5817,107 @@
         </p:blipFill>
         <p:spPr>
           <a:xfrm>
-            <a:off x="7366000" y="1574641"/>
-            <a:ext cx="3175000" cy="2387600"/>
+            <a:off x="7949681" y="-91491"/>
+            <a:ext cx="3674315" cy="3674315"/>
           </a:xfrm>
           <a:prstGeom prst="rect">
             <a:avLst/>
           </a:prstGeom>
         </p:spPr>
       </p:pic>
+      <p:sp>
+        <p:nvSpPr>
+          <p:cNvPr id="2" name="Titel 1"/>
+          <p:cNvSpPr>
+            <a:spLocks noGrp="1"/>
+          </p:cNvSpPr>
+          <p:nvPr>
+            <p:ph type="ctrTitle"/>
+          </p:nvPr>
+        </p:nvSpPr>
+        <p:spPr/>
+        <p:txBody>
+          <a:bodyPr/>
+          <a:lstStyle/>
+          <a:p>
+            <a:r>
+              <a:rPr lang="de-CH" dirty="0" err="1"/>
+              <a:t>Thank</a:t>
+            </a:r>
+            <a:r>
+              <a:rPr lang="de-CH" dirty="0"/>
+              <a:t> </a:t>
+            </a:r>
+            <a:r>
+              <a:rPr lang="de-CH" dirty="0" err="1"/>
+              <a:t>you</a:t>
+            </a:r>
+            <a:r>
+              <a:rPr lang="de-CH" dirty="0"/>
+              <a:t> </a:t>
+            </a:r>
+            <a:r>
+              <a:rPr lang="de-CH" dirty="0" err="1"/>
+              <a:t>for</a:t>
+            </a:r>
+            <a:r>
+              <a:rPr lang="de-CH" dirty="0"/>
+              <a:t> </a:t>
+            </a:r>
+            <a:r>
+              <a:rPr lang="de-CH" dirty="0" err="1"/>
+              <a:t>listening</a:t>
+            </a:r>
+            <a:endParaRPr lang="de-CH" dirty="0"/>
+          </a:p>
+        </p:txBody>
+      </p:sp>
+      <p:sp>
+        <p:nvSpPr>
+          <p:cNvPr id="3" name="Untertitel 2"/>
+          <p:cNvSpPr>
+            <a:spLocks noGrp="1"/>
+          </p:cNvSpPr>
+          <p:nvPr>
+            <p:ph type="subTitle" idx="1"/>
+          </p:nvPr>
+        </p:nvSpPr>
+        <p:spPr/>
+        <p:txBody>
+          <a:bodyPr>
+            <a:normAutofit fontScale="92500" lnSpcReduction="20000"/>
+          </a:bodyPr>
+          <a:lstStyle/>
+          <a:p>
+            <a:r>
+              <a:rPr lang="de-CH" dirty="0"/>
+              <a:t>Raphael Emberger</a:t>
+            </a:r>
+          </a:p>
+          <a:p>
+            <a:r>
+              <a:rPr lang="de-CH" dirty="0"/>
+              <a:t>Stefan Bösch</a:t>
+            </a:r>
+          </a:p>
+          <a:p>
+            <a:r>
+              <a:rPr lang="de-CH" dirty="0"/>
+              <a:t>Philipp Meier</a:t>
+            </a:r>
+          </a:p>
+          <a:p>
+            <a:r>
+              <a:rPr lang="de-CH" dirty="0"/>
+              <a:t>Nicolas Eckhart</a:t>
+            </a:r>
+          </a:p>
+        </p:txBody>
+      </p:sp>
     </p:spTree>
     <p:extLst>
       <p:ext uri="{BB962C8B-B14F-4D97-AF65-F5344CB8AC3E}">
-        <p14:creationId xmlns:p14="http://schemas.microsoft.com/office/powerpoint/2010/main" val="89417333"/>
+        <p14:creationId xmlns:p14="http://schemas.microsoft.com/office/powerpoint/2010/main" val="4140532926"/>
       </p:ext>
     </p:extLst>
   </p:cSld>

</xml_diff>

<commit_message>
added bp to slide 3
</commit_message>
<xml_diff>
--- a/doc/Presentation.pptx
+++ b/doc/Presentation.pptx
@@ -204,7 +204,7 @@
           <a:p>
             <a:fld id="{996702D7-FFC7-4541-8679-A800B838F073}" type="datetimeFigureOut">
               <a:rPr lang="en-US" smtClean="0"/>
-              <a:t>10/3/2017</a:t>
+              <a:t>10/3/17</a:t>
             </a:fld>
             <a:endParaRPr lang="en-US"/>
           </a:p>
@@ -362,7 +362,7 @@
           <a:p>
             <a:fld id="{A4838B1D-A33A-4C45-A183-851BF801C5ED}" type="slidenum">
               <a:rPr lang="en-US" smtClean="0"/>
-              <a:t>‹Nr.›</a:t>
+              <a:t>‹#›</a:t>
             </a:fld>
             <a:endParaRPr lang="en-US"/>
           </a:p>
@@ -629,7 +629,7 @@
           <a:p>
             <a:fld id="{92B3D0C1-4C55-4174-ACB6-FE14EF983A6D}" type="datetimeFigureOut">
               <a:rPr lang="de-CH" smtClean="0"/>
-              <a:t>03.10.2017</a:t>
+              <a:t>03.10.17</a:t>
             </a:fld>
             <a:endParaRPr lang="de-CH"/>
           </a:p>
@@ -691,7 +691,7 @@
           <a:p>
             <a:fld id="{216A1CAF-9D75-4D9A-A163-4634AE7ED004}" type="slidenum">
               <a:rPr lang="de-CH" smtClean="0"/>
-              <a:t>‹Nr.›</a:t>
+              <a:t>‹#›</a:t>
             </a:fld>
             <a:endParaRPr lang="de-CH"/>
           </a:p>
@@ -857,7 +857,7 @@
           <a:p>
             <a:fld id="{92B3D0C1-4C55-4174-ACB6-FE14EF983A6D}" type="datetimeFigureOut">
               <a:rPr lang="de-CH" smtClean="0"/>
-              <a:t>03.10.2017</a:t>
+              <a:t>03.10.17</a:t>
             </a:fld>
             <a:endParaRPr lang="de-CH"/>
           </a:p>
@@ -899,7 +899,7 @@
           <a:p>
             <a:fld id="{216A1CAF-9D75-4D9A-A163-4634AE7ED004}" type="slidenum">
               <a:rPr lang="de-CH" smtClean="0"/>
-              <a:t>‹Nr.›</a:t>
+              <a:t>‹#›</a:t>
             </a:fld>
             <a:endParaRPr lang="de-CH"/>
           </a:p>
@@ -1037,7 +1037,7 @@
           <a:p>
             <a:fld id="{92B3D0C1-4C55-4174-ACB6-FE14EF983A6D}" type="datetimeFigureOut">
               <a:rPr lang="de-CH" smtClean="0"/>
-              <a:t>03.10.2017</a:t>
+              <a:t>03.10.17</a:t>
             </a:fld>
             <a:endParaRPr lang="de-CH"/>
           </a:p>
@@ -1079,7 +1079,7 @@
           <a:p>
             <a:fld id="{216A1CAF-9D75-4D9A-A163-4634AE7ED004}" type="slidenum">
               <a:rPr lang="de-CH" smtClean="0"/>
-              <a:t>‹Nr.›</a:t>
+              <a:t>‹#›</a:t>
             </a:fld>
             <a:endParaRPr lang="de-CH"/>
           </a:p>
@@ -1207,7 +1207,7 @@
           <a:p>
             <a:fld id="{92B3D0C1-4C55-4174-ACB6-FE14EF983A6D}" type="datetimeFigureOut">
               <a:rPr lang="de-CH" smtClean="0"/>
-              <a:t>03.10.2017</a:t>
+              <a:t>03.10.17</a:t>
             </a:fld>
             <a:endParaRPr lang="de-CH"/>
           </a:p>
@@ -1249,7 +1249,7 @@
           <a:p>
             <a:fld id="{216A1CAF-9D75-4D9A-A163-4634AE7ED004}" type="slidenum">
               <a:rPr lang="de-CH" smtClean="0"/>
-              <a:t>‹Nr.›</a:t>
+              <a:t>‹#›</a:t>
             </a:fld>
             <a:endParaRPr lang="de-CH"/>
           </a:p>
@@ -1461,7 +1461,7 @@
           <a:p>
             <a:fld id="{92B3D0C1-4C55-4174-ACB6-FE14EF983A6D}" type="datetimeFigureOut">
               <a:rPr lang="de-CH" smtClean="0"/>
-              <a:t>03.10.2017</a:t>
+              <a:t>03.10.17</a:t>
             </a:fld>
             <a:endParaRPr lang="de-CH"/>
           </a:p>
@@ -1503,7 +1503,7 @@
           <a:p>
             <a:fld id="{216A1CAF-9D75-4D9A-A163-4634AE7ED004}" type="slidenum">
               <a:rPr lang="de-CH" smtClean="0"/>
-              <a:t>‹Nr.›</a:t>
+              <a:t>‹#›</a:t>
             </a:fld>
             <a:endParaRPr lang="de-CH"/>
           </a:p>
@@ -1787,7 +1787,7 @@
           <a:p>
             <a:fld id="{92B3D0C1-4C55-4174-ACB6-FE14EF983A6D}" type="datetimeFigureOut">
               <a:rPr lang="de-CH" smtClean="0"/>
-              <a:t>03.10.2017</a:t>
+              <a:t>03.10.17</a:t>
             </a:fld>
             <a:endParaRPr lang="de-CH"/>
           </a:p>
@@ -1829,7 +1829,7 @@
           <a:p>
             <a:fld id="{216A1CAF-9D75-4D9A-A163-4634AE7ED004}" type="slidenum">
               <a:rPr lang="de-CH" smtClean="0"/>
-              <a:t>‹Nr.›</a:t>
+              <a:t>‹#›</a:t>
             </a:fld>
             <a:endParaRPr lang="de-CH"/>
           </a:p>
@@ -2238,7 +2238,7 @@
           <a:p>
             <a:fld id="{92B3D0C1-4C55-4174-ACB6-FE14EF983A6D}" type="datetimeFigureOut">
               <a:rPr lang="de-CH" smtClean="0"/>
-              <a:t>03.10.2017</a:t>
+              <a:t>03.10.17</a:t>
             </a:fld>
             <a:endParaRPr lang="de-CH"/>
           </a:p>
@@ -2280,7 +2280,7 @@
           <a:p>
             <a:fld id="{216A1CAF-9D75-4D9A-A163-4634AE7ED004}" type="slidenum">
               <a:rPr lang="de-CH" smtClean="0"/>
-              <a:t>‹Nr.›</a:t>
+              <a:t>‹#›</a:t>
             </a:fld>
             <a:endParaRPr lang="de-CH"/>
           </a:p>
@@ -2356,7 +2356,7 @@
           <a:p>
             <a:fld id="{92B3D0C1-4C55-4174-ACB6-FE14EF983A6D}" type="datetimeFigureOut">
               <a:rPr lang="de-CH" smtClean="0"/>
-              <a:t>03.10.2017</a:t>
+              <a:t>03.10.17</a:t>
             </a:fld>
             <a:endParaRPr lang="de-CH"/>
           </a:p>
@@ -2398,7 +2398,7 @@
           <a:p>
             <a:fld id="{216A1CAF-9D75-4D9A-A163-4634AE7ED004}" type="slidenum">
               <a:rPr lang="de-CH" smtClean="0"/>
-              <a:t>‹Nr.›</a:t>
+              <a:t>‹#›</a:t>
             </a:fld>
             <a:endParaRPr lang="de-CH"/>
           </a:p>
@@ -2451,7 +2451,7 @@
           <a:p>
             <a:fld id="{92B3D0C1-4C55-4174-ACB6-FE14EF983A6D}" type="datetimeFigureOut">
               <a:rPr lang="de-CH" smtClean="0"/>
-              <a:t>03.10.2017</a:t>
+              <a:t>03.10.17</a:t>
             </a:fld>
             <a:endParaRPr lang="de-CH"/>
           </a:p>
@@ -2493,7 +2493,7 @@
           <a:p>
             <a:fld id="{216A1CAF-9D75-4D9A-A163-4634AE7ED004}" type="slidenum">
               <a:rPr lang="de-CH" smtClean="0"/>
-              <a:t>‹Nr.›</a:t>
+              <a:t>‹#›</a:t>
             </a:fld>
             <a:endParaRPr lang="de-CH"/>
           </a:p>
@@ -2738,7 +2738,7 @@
           <a:p>
             <a:fld id="{92B3D0C1-4C55-4174-ACB6-FE14EF983A6D}" type="datetimeFigureOut">
               <a:rPr lang="de-CH" smtClean="0"/>
-              <a:t>03.10.2017</a:t>
+              <a:t>03.10.17</a:t>
             </a:fld>
             <a:endParaRPr lang="de-CH"/>
           </a:p>
@@ -2780,7 +2780,7 @@
           <a:p>
             <a:fld id="{216A1CAF-9D75-4D9A-A163-4634AE7ED004}" type="slidenum">
               <a:rPr lang="de-CH" smtClean="0"/>
-              <a:t>‹Nr.›</a:t>
+              <a:t>‹#›</a:t>
             </a:fld>
             <a:endParaRPr lang="de-CH"/>
           </a:p>
@@ -3063,7 +3063,7 @@
           <a:p>
             <a:fld id="{92B3D0C1-4C55-4174-ACB6-FE14EF983A6D}" type="datetimeFigureOut">
               <a:rPr lang="de-CH" smtClean="0"/>
-              <a:t>03.10.2017</a:t>
+              <a:t>03.10.17</a:t>
             </a:fld>
             <a:endParaRPr lang="de-CH"/>
           </a:p>
@@ -3105,7 +3105,7 @@
           <a:p>
             <a:fld id="{216A1CAF-9D75-4D9A-A163-4634AE7ED004}" type="slidenum">
               <a:rPr lang="de-CH" smtClean="0"/>
-              <a:t>‹Nr.›</a:t>
+              <a:t>‹#›</a:t>
             </a:fld>
             <a:endParaRPr lang="de-CH"/>
           </a:p>
@@ -3317,7 +3317,7 @@
           <a:p>
             <a:fld id="{92B3D0C1-4C55-4174-ACB6-FE14EF983A6D}" type="datetimeFigureOut">
               <a:rPr lang="de-CH" smtClean="0"/>
-              <a:t>03.10.2017</a:t>
+              <a:t>03.10.17</a:t>
             </a:fld>
             <a:endParaRPr lang="de-CH"/>
           </a:p>
@@ -3399,7 +3399,7 @@
           <a:p>
             <a:fld id="{216A1CAF-9D75-4D9A-A163-4634AE7ED004}" type="slidenum">
               <a:rPr lang="de-CH" smtClean="0"/>
-              <a:t>‹Nr.›</a:t>
+              <a:t>‹#›</a:t>
             </a:fld>
             <a:endParaRPr lang="de-CH"/>
           </a:p>
@@ -3810,7 +3810,7 @@
           <p:cNvPr id="5" name="Grafik 4">
             <a:extLst>
               <a:ext uri="{FF2B5EF4-FFF2-40B4-BE49-F238E27FC236}">
-                <a16:creationId xmlns:a16="http://schemas.microsoft.com/office/drawing/2014/main" id="{3CCF4D3B-7A0F-4753-9950-8C3AFE3346D9}"/>
+                <a16:creationId xmlns:a16="http://schemas.microsoft.com/office/drawing/2014/main" xmlns="" id="{3CCF4D3B-7A0F-4753-9950-8C3AFE3346D9}"/>
               </a:ext>
             </a:extLst>
           </p:cNvPr>
@@ -3915,6 +3915,13 @@
   <p:clrMapOvr>
     <a:masterClrMapping/>
   </p:clrMapOvr>
+  <p:timing>
+    <p:tnLst>
+      <p:par>
+        <p:cTn id="1" dur="indefinite" restart="never" nodeType="tmRoot"/>
+      </p:par>
+    </p:tnLst>
+  </p:timing>
 </p:sld>
 </file>
 
@@ -4385,6 +4392,375 @@
   <p:clrMapOvr>
     <a:masterClrMapping/>
   </p:clrMapOvr>
+  <p:timing>
+    <p:tnLst>
+      <p:par>
+        <p:cTn id="1" dur="indefinite" restart="never" nodeType="tmRoot">
+          <p:childTnLst>
+            <p:seq concurrent="1" nextAc="seek">
+              <p:cTn id="2" dur="indefinite" nodeType="mainSeq">
+                <p:childTnLst>
+                  <p:par>
+                    <p:cTn id="3" fill="hold">
+                      <p:stCondLst>
+                        <p:cond delay="indefinite"/>
+                      </p:stCondLst>
+                      <p:childTnLst>
+                        <p:par>
+                          <p:cTn id="4" fill="hold">
+                            <p:stCondLst>
+                              <p:cond delay="0"/>
+                            </p:stCondLst>
+                            <p:childTnLst>
+                              <p:par>
+                                <p:cTn id="5" presetID="1" presetClass="entr" presetSubtype="0" fill="hold" nodeType="clickEffect">
+                                  <p:stCondLst>
+                                    <p:cond delay="0"/>
+                                  </p:stCondLst>
+                                  <p:childTnLst>
+                                    <p:set>
+                                      <p:cBhvr>
+                                        <p:cTn id="6" dur="1" fill="hold">
+                                          <p:stCondLst>
+                                            <p:cond delay="0"/>
+                                          </p:stCondLst>
+                                        </p:cTn>
+                                        <p:tgtEl>
+                                          <p:spTgt spid="3">
+                                            <p:txEl>
+                                              <p:pRg st="0" end="0"/>
+                                            </p:txEl>
+                                          </p:spTgt>
+                                        </p:tgtEl>
+                                        <p:attrNameLst>
+                                          <p:attrName>style.visibility</p:attrName>
+                                        </p:attrNameLst>
+                                      </p:cBhvr>
+                                      <p:to>
+                                        <p:strVal val="visible"/>
+                                      </p:to>
+                                    </p:set>
+                                  </p:childTnLst>
+                                </p:cTn>
+                              </p:par>
+                            </p:childTnLst>
+                          </p:cTn>
+                        </p:par>
+                      </p:childTnLst>
+                    </p:cTn>
+                  </p:par>
+                  <p:par>
+                    <p:cTn id="7" fill="hold">
+                      <p:stCondLst>
+                        <p:cond delay="indefinite"/>
+                      </p:stCondLst>
+                      <p:childTnLst>
+                        <p:par>
+                          <p:cTn id="8" fill="hold">
+                            <p:stCondLst>
+                              <p:cond delay="0"/>
+                            </p:stCondLst>
+                            <p:childTnLst>
+                              <p:par>
+                                <p:cTn id="9" presetID="1" presetClass="entr" presetSubtype="0" fill="hold" nodeType="clickEffect">
+                                  <p:stCondLst>
+                                    <p:cond delay="0"/>
+                                  </p:stCondLst>
+                                  <p:childTnLst>
+                                    <p:set>
+                                      <p:cBhvr>
+                                        <p:cTn id="10" dur="1" fill="hold">
+                                          <p:stCondLst>
+                                            <p:cond delay="0"/>
+                                          </p:stCondLst>
+                                        </p:cTn>
+                                        <p:tgtEl>
+                                          <p:spTgt spid="3">
+                                            <p:txEl>
+                                              <p:pRg st="1" end="1"/>
+                                            </p:txEl>
+                                          </p:spTgt>
+                                        </p:tgtEl>
+                                        <p:attrNameLst>
+                                          <p:attrName>style.visibility</p:attrName>
+                                        </p:attrNameLst>
+                                      </p:cBhvr>
+                                      <p:to>
+                                        <p:strVal val="visible"/>
+                                      </p:to>
+                                    </p:set>
+                                  </p:childTnLst>
+                                </p:cTn>
+                              </p:par>
+                            </p:childTnLst>
+                          </p:cTn>
+                        </p:par>
+                      </p:childTnLst>
+                    </p:cTn>
+                  </p:par>
+                  <p:par>
+                    <p:cTn id="11" fill="hold">
+                      <p:stCondLst>
+                        <p:cond delay="indefinite"/>
+                      </p:stCondLst>
+                      <p:childTnLst>
+                        <p:par>
+                          <p:cTn id="12" fill="hold">
+                            <p:stCondLst>
+                              <p:cond delay="0"/>
+                            </p:stCondLst>
+                            <p:childTnLst>
+                              <p:par>
+                                <p:cTn id="13" presetID="1" presetClass="entr" presetSubtype="0" fill="hold" nodeType="clickEffect">
+                                  <p:stCondLst>
+                                    <p:cond delay="0"/>
+                                  </p:stCondLst>
+                                  <p:childTnLst>
+                                    <p:set>
+                                      <p:cBhvr>
+                                        <p:cTn id="14" dur="1" fill="hold">
+                                          <p:stCondLst>
+                                            <p:cond delay="0"/>
+                                          </p:stCondLst>
+                                        </p:cTn>
+                                        <p:tgtEl>
+                                          <p:spTgt spid="3">
+                                            <p:txEl>
+                                              <p:pRg st="2" end="2"/>
+                                            </p:txEl>
+                                          </p:spTgt>
+                                        </p:tgtEl>
+                                        <p:attrNameLst>
+                                          <p:attrName>style.visibility</p:attrName>
+                                        </p:attrNameLst>
+                                      </p:cBhvr>
+                                      <p:to>
+                                        <p:strVal val="visible"/>
+                                      </p:to>
+                                    </p:set>
+                                  </p:childTnLst>
+                                </p:cTn>
+                              </p:par>
+                            </p:childTnLst>
+                          </p:cTn>
+                        </p:par>
+                      </p:childTnLst>
+                    </p:cTn>
+                  </p:par>
+                  <p:par>
+                    <p:cTn id="15" fill="hold">
+                      <p:stCondLst>
+                        <p:cond delay="indefinite"/>
+                      </p:stCondLst>
+                      <p:childTnLst>
+                        <p:par>
+                          <p:cTn id="16" fill="hold">
+                            <p:stCondLst>
+                              <p:cond delay="0"/>
+                            </p:stCondLst>
+                            <p:childTnLst>
+                              <p:par>
+                                <p:cTn id="17" presetID="1" presetClass="entr" presetSubtype="0" fill="hold" nodeType="clickEffect">
+                                  <p:stCondLst>
+                                    <p:cond delay="0"/>
+                                  </p:stCondLst>
+                                  <p:childTnLst>
+                                    <p:set>
+                                      <p:cBhvr>
+                                        <p:cTn id="18" dur="1" fill="hold">
+                                          <p:stCondLst>
+                                            <p:cond delay="0"/>
+                                          </p:stCondLst>
+                                        </p:cTn>
+                                        <p:tgtEl>
+                                          <p:spTgt spid="6"/>
+                                        </p:tgtEl>
+                                        <p:attrNameLst>
+                                          <p:attrName>style.visibility</p:attrName>
+                                        </p:attrNameLst>
+                                      </p:cBhvr>
+                                      <p:to>
+                                        <p:strVal val="visible"/>
+                                      </p:to>
+                                    </p:set>
+                                  </p:childTnLst>
+                                </p:cTn>
+                              </p:par>
+                            </p:childTnLst>
+                          </p:cTn>
+                        </p:par>
+                      </p:childTnLst>
+                    </p:cTn>
+                  </p:par>
+                  <p:par>
+                    <p:cTn id="19" fill="hold">
+                      <p:stCondLst>
+                        <p:cond delay="indefinite"/>
+                      </p:stCondLst>
+                      <p:childTnLst>
+                        <p:par>
+                          <p:cTn id="20" fill="hold">
+                            <p:stCondLst>
+                              <p:cond delay="0"/>
+                            </p:stCondLst>
+                            <p:childTnLst>
+                              <p:par>
+                                <p:cTn id="21" presetID="1" presetClass="entr" presetSubtype="0" fill="hold" nodeType="clickEffect">
+                                  <p:stCondLst>
+                                    <p:cond delay="0"/>
+                                  </p:stCondLst>
+                                  <p:childTnLst>
+                                    <p:set>
+                                      <p:cBhvr>
+                                        <p:cTn id="22" dur="1" fill="hold">
+                                          <p:stCondLst>
+                                            <p:cond delay="0"/>
+                                          </p:stCondLst>
+                                        </p:cTn>
+                                        <p:tgtEl>
+                                          <p:spTgt spid="4">
+                                            <p:txEl>
+                                              <p:pRg st="0" end="0"/>
+                                            </p:txEl>
+                                          </p:spTgt>
+                                        </p:tgtEl>
+                                        <p:attrNameLst>
+                                          <p:attrName>style.visibility</p:attrName>
+                                        </p:attrNameLst>
+                                      </p:cBhvr>
+                                      <p:to>
+                                        <p:strVal val="visible"/>
+                                      </p:to>
+                                    </p:set>
+                                  </p:childTnLst>
+                                </p:cTn>
+                              </p:par>
+                            </p:childTnLst>
+                          </p:cTn>
+                        </p:par>
+                      </p:childTnLst>
+                    </p:cTn>
+                  </p:par>
+                  <p:par>
+                    <p:cTn id="23" fill="hold">
+                      <p:stCondLst>
+                        <p:cond delay="indefinite"/>
+                      </p:stCondLst>
+                      <p:childTnLst>
+                        <p:par>
+                          <p:cTn id="24" fill="hold">
+                            <p:stCondLst>
+                              <p:cond delay="0"/>
+                            </p:stCondLst>
+                            <p:childTnLst>
+                              <p:par>
+                                <p:cTn id="25" presetID="1" presetClass="entr" presetSubtype="0" fill="hold" nodeType="clickEffect">
+                                  <p:stCondLst>
+                                    <p:cond delay="0"/>
+                                  </p:stCondLst>
+                                  <p:childTnLst>
+                                    <p:set>
+                                      <p:cBhvr>
+                                        <p:cTn id="26" dur="1" fill="hold">
+                                          <p:stCondLst>
+                                            <p:cond delay="0"/>
+                                          </p:stCondLst>
+                                        </p:cTn>
+                                        <p:tgtEl>
+                                          <p:spTgt spid="5">
+                                            <p:txEl>
+                                              <p:pRg st="0" end="0"/>
+                                            </p:txEl>
+                                          </p:spTgt>
+                                        </p:tgtEl>
+                                        <p:attrNameLst>
+                                          <p:attrName>style.visibility</p:attrName>
+                                        </p:attrNameLst>
+                                      </p:cBhvr>
+                                      <p:to>
+                                        <p:strVal val="visible"/>
+                                      </p:to>
+                                    </p:set>
+                                  </p:childTnLst>
+                                </p:cTn>
+                              </p:par>
+                            </p:childTnLst>
+                          </p:cTn>
+                        </p:par>
+                      </p:childTnLst>
+                    </p:cTn>
+                  </p:par>
+                  <p:par>
+                    <p:cTn id="27" fill="hold">
+                      <p:stCondLst>
+                        <p:cond delay="indefinite"/>
+                      </p:stCondLst>
+                      <p:childTnLst>
+                        <p:par>
+                          <p:cTn id="28" fill="hold">
+                            <p:stCondLst>
+                              <p:cond delay="0"/>
+                            </p:stCondLst>
+                            <p:childTnLst>
+                              <p:par>
+                                <p:cTn id="29" presetID="1" presetClass="entr" presetSubtype="0" fill="hold" nodeType="clickEffect">
+                                  <p:stCondLst>
+                                    <p:cond delay="0"/>
+                                  </p:stCondLst>
+                                  <p:childTnLst>
+                                    <p:set>
+                                      <p:cBhvr>
+                                        <p:cTn id="30" dur="1" fill="hold">
+                                          <p:stCondLst>
+                                            <p:cond delay="0"/>
+                                          </p:stCondLst>
+                                        </p:cTn>
+                                        <p:tgtEl>
+                                          <p:spTgt spid="5">
+                                            <p:txEl>
+                                              <p:pRg st="1" end="1"/>
+                                            </p:txEl>
+                                          </p:spTgt>
+                                        </p:tgtEl>
+                                        <p:attrNameLst>
+                                          <p:attrName>style.visibility</p:attrName>
+                                        </p:attrNameLst>
+                                      </p:cBhvr>
+                                      <p:to>
+                                        <p:strVal val="visible"/>
+                                      </p:to>
+                                    </p:set>
+                                  </p:childTnLst>
+                                </p:cTn>
+                              </p:par>
+                            </p:childTnLst>
+                          </p:cTn>
+                        </p:par>
+                      </p:childTnLst>
+                    </p:cTn>
+                  </p:par>
+                </p:childTnLst>
+              </p:cTn>
+              <p:prevCondLst>
+                <p:cond evt="onPrev" delay="0">
+                  <p:tgtEl>
+                    <p:sldTgt/>
+                  </p:tgtEl>
+                </p:cond>
+              </p:prevCondLst>
+              <p:nextCondLst>
+                <p:cond evt="onNext" delay="0">
+                  <p:tgtEl>
+                    <p:sldTgt/>
+                  </p:tgtEl>
+                </p:cond>
+              </p:nextCondLst>
+            </p:seq>
+          </p:childTnLst>
+        </p:cTn>
+      </p:par>
+    </p:tnLst>
+  </p:timing>
 </p:sld>
 </file>
 
@@ -4700,11 +5076,22 @@
           <a:lstStyle/>
           <a:p>
             <a:r>
-              <a:rPr lang="de-CH" dirty="0"/>
+              <a:rPr lang="de-CH" dirty="0" smtClean="0"/>
+              <a:t>Main </a:t>
+            </a:r>
+            <a:r>
+              <a:rPr lang="de-CH" dirty="0" err="1" smtClean="0"/>
+              <a:t>Process</a:t>
+            </a:r>
+            <a:endParaRPr lang="de-CH" dirty="0" smtClean="0"/>
+          </a:p>
+          <a:p>
+            <a:r>
+              <a:rPr lang="de-CH" dirty="0" smtClean="0"/>
               <a:t>Multi-</a:t>
             </a:r>
             <a:r>
-              <a:rPr lang="de-CH" dirty="0" err="1"/>
+              <a:rPr lang="de-CH" dirty="0" err="1" smtClean="0"/>
               <a:t>layered</a:t>
             </a:r>
             <a:endParaRPr lang="de-CH" dirty="0"/>
@@ -5769,6 +6156,13 @@
   <p:clrMapOvr>
     <a:masterClrMapping/>
   </p:clrMapOvr>
+  <p:timing>
+    <p:tnLst>
+      <p:par>
+        <p:cTn id="1" dur="indefinite" restart="never" nodeType="tmRoot"/>
+      </p:par>
+    </p:tnLst>
+  </p:timing>
 </p:sld>
 </file>
 
@@ -5794,7 +6188,7 @@
           <p:cNvPr id="8" name="Grafik 7">
             <a:extLst>
               <a:ext uri="{FF2B5EF4-FFF2-40B4-BE49-F238E27FC236}">
-                <a16:creationId xmlns:a16="http://schemas.microsoft.com/office/drawing/2014/main" id="{FEADF4F9-87B1-447B-A6E7-8A6D9620218C}"/>
+                <a16:creationId xmlns:a16="http://schemas.microsoft.com/office/drawing/2014/main" xmlns="" id="{FEADF4F9-87B1-447B-A6E7-8A6D9620218C}"/>
               </a:ext>
             </a:extLst>
           </p:cNvPr>
@@ -5924,6 +6318,13 @@
   <p:clrMapOvr>
     <a:masterClrMapping/>
   </p:clrMapOvr>
+  <p:timing>
+    <p:tnLst>
+      <p:par>
+        <p:cTn id="1" dur="indefinite" restart="never" nodeType="tmRoot"/>
+      </p:par>
+    </p:tnLst>
+  </p:timing>
 </p:sld>
 </file>
 

</xml_diff>

<commit_message>
added name to slides
</commit_message>
<xml_diff>
--- a/doc/Presentation.pptx
+++ b/doc/Presentation.pptx
@@ -3810,7 +3810,7 @@
           <p:cNvPr id="5" name="Grafik 4">
             <a:extLst>
               <a:ext uri="{FF2B5EF4-FFF2-40B4-BE49-F238E27FC236}">
-                <a16:creationId xmlns:a16="http://schemas.microsoft.com/office/drawing/2014/main" xmlns="" id="{3CCF4D3B-7A0F-4753-9950-8C3AFE3346D9}"/>
+                <a16:creationId xmlns="" xmlns:a16="http://schemas.microsoft.com/office/drawing/2014/main" id="{3CCF4D3B-7A0F-4753-9950-8C3AFE3346D9}"/>
               </a:ext>
             </a:extLst>
           </p:cNvPr>
@@ -3857,9 +3857,22 @@
           <a:lstStyle/>
           <a:p>
             <a:r>
-              <a:rPr lang="de-CH" dirty="0"/>
-              <a:t>PSIT3 – Group 5</a:t>
-            </a:r>
+              <a:rPr lang="de-CH" dirty="0" smtClean="0"/>
+              <a:t>Tower </a:t>
+            </a:r>
+            <a:r>
+              <a:rPr lang="de-CH" dirty="0" err="1" smtClean="0"/>
+              <a:t>Hopscotch</a:t>
+            </a:r>
+            <a:r>
+              <a:rPr lang="de-CH" smtClean="0"/>
+              <a:t> </a:t>
+            </a:r>
+            <a:r>
+              <a:rPr lang="de-CH" sz="2000" smtClean="0"/>
+              <a:t>Group 5</a:t>
+            </a:r>
+            <a:endParaRPr lang="de-CH" dirty="0"/>
           </a:p>
         </p:txBody>
       </p:sp>
@@ -6188,7 +6201,7 @@
           <p:cNvPr id="8" name="Grafik 7">
             <a:extLst>
               <a:ext uri="{FF2B5EF4-FFF2-40B4-BE49-F238E27FC236}">
-                <a16:creationId xmlns:a16="http://schemas.microsoft.com/office/drawing/2014/main" xmlns="" id="{FEADF4F9-87B1-447B-A6E7-8A6D9620218C}"/>
+                <a16:creationId xmlns="" xmlns:a16="http://schemas.microsoft.com/office/drawing/2014/main" id="{FEADF4F9-87B1-447B-A6E7-8A6D9620218C}"/>
               </a:ext>
             </a:extLst>
           </p:cNvPr>

</xml_diff>

<commit_message>
added animations and an image to slides
</commit_message>
<xml_diff>
--- a/doc/Presentation.pptx
+++ b/doc/Presentation.pptx
@@ -3810,7 +3810,7 @@
           <p:cNvPr id="5" name="Grafik 4">
             <a:extLst>
               <a:ext uri="{FF2B5EF4-FFF2-40B4-BE49-F238E27FC236}">
-                <a16:creationId xmlns="" xmlns:a16="http://schemas.microsoft.com/office/drawing/2014/main" id="{3CCF4D3B-7A0F-4753-9950-8C3AFE3346D9}"/>
+                <a16:creationId xmlns:a16="http://schemas.microsoft.com/office/drawing/2014/main" xmlns="" id="{3CCF4D3B-7A0F-4753-9950-8C3AFE3346D9}"/>
               </a:ext>
             </a:extLst>
           </p:cNvPr>
@@ -4387,12 +4387,53 @@
         </p:blipFill>
         <p:spPr>
           <a:xfrm>
-            <a:off x="7366000" y="1574641"/>
+            <a:off x="7140222" y="988377"/>
             <a:ext cx="3175000" cy="2387600"/>
           </a:xfrm>
           <a:prstGeom prst="rect">
             <a:avLst/>
           </a:prstGeom>
+        </p:spPr>
+      </p:pic>
+      <p:pic>
+        <p:nvPicPr>
+          <p:cNvPr id="1026" name="Picture 2" descr="ttp://cdn.playbuzz.com/cdn/68ab3df9-9b92-4cfc-9513-b761f2e696ea/296913e5-fcd8-452d-80ca-eae8f3e80bb4.png"/>
+          <p:cNvPicPr>
+            <a:picLocks noChangeAspect="1" noChangeArrowheads="1"/>
+          </p:cNvPicPr>
+          <p:nvPr/>
+        </p:nvPicPr>
+        <p:blipFill>
+          <a:blip r:embed="rId3">
+            <a:extLst>
+              <a:ext uri="{28A0092B-C50C-407E-A947-70E740481C1C}">
+                <a14:useLocalDpi xmlns:a14="http://schemas.microsoft.com/office/drawing/2010/main" val="0"/>
+              </a:ext>
+            </a:extLst>
+          </a:blip>
+          <a:srcRect/>
+          <a:stretch>
+            <a:fillRect/>
+          </a:stretch>
+        </p:blipFill>
+        <p:spPr bwMode="auto">
+          <a:xfrm>
+            <a:off x="8170649" y="4211239"/>
+            <a:ext cx="2013961" cy="2057245"/>
+          </a:xfrm>
+          <a:prstGeom prst="rect">
+            <a:avLst/>
+          </a:prstGeom>
+          <a:noFill/>
+          <a:extLst>
+            <a:ext uri="{909E8E84-426E-40DD-AFC4-6F175D3DCCD1}">
+              <a14:hiddenFill xmlns:a14="http://schemas.microsoft.com/office/drawing/2010/main">
+                <a:solidFill>
+                  <a:srgbClr val="FFFFFF"/>
+                </a:solidFill>
+              </a14:hiddenFill>
+            </a:ext>
+          </a:extLst>
         </p:spPr>
       </p:pic>
     </p:spTree>
@@ -4734,6 +4775,51 @@
                                               <p:pRg st="1" end="1"/>
                                             </p:txEl>
                                           </p:spTgt>
+                                        </p:tgtEl>
+                                        <p:attrNameLst>
+                                          <p:attrName>style.visibility</p:attrName>
+                                        </p:attrNameLst>
+                                      </p:cBhvr>
+                                      <p:to>
+                                        <p:strVal val="visible"/>
+                                      </p:to>
+                                    </p:set>
+                                  </p:childTnLst>
+                                </p:cTn>
+                              </p:par>
+                            </p:childTnLst>
+                          </p:cTn>
+                        </p:par>
+                      </p:childTnLst>
+                    </p:cTn>
+                  </p:par>
+                  <p:par>
+                    <p:cTn id="31" fill="hold">
+                      <p:stCondLst>
+                        <p:cond delay="indefinite"/>
+                      </p:stCondLst>
+                      <p:childTnLst>
+                        <p:par>
+                          <p:cTn id="32" fill="hold">
+                            <p:stCondLst>
+                              <p:cond delay="0"/>
+                            </p:stCondLst>
+                            <p:childTnLst>
+                              <p:par>
+                                <p:cTn id="33" presetID="1" presetClass="entr" presetSubtype="0" fill="hold" nodeType="clickEffect">
+                                  <p:stCondLst>
+                                    <p:cond delay="0"/>
+                                  </p:stCondLst>
+                                  <p:childTnLst>
+                                    <p:set>
+                                      <p:cBhvr>
+                                        <p:cTn id="34" dur="1" fill="hold">
+                                          <p:stCondLst>
+                                            <p:cond delay="0"/>
+                                          </p:stCondLst>
+                                        </p:cTn>
+                                        <p:tgtEl>
+                                          <p:spTgt spid="1026"/>
                                         </p:tgtEl>
                                         <p:attrNameLst>
                                           <p:attrName>style.visibility</p:attrName>
@@ -6172,7 +6258,177 @@
   <p:timing>
     <p:tnLst>
       <p:par>
-        <p:cTn id="1" dur="indefinite" restart="never" nodeType="tmRoot"/>
+        <p:cTn id="1" dur="indefinite" restart="never" nodeType="tmRoot">
+          <p:childTnLst>
+            <p:seq concurrent="1" nextAc="seek">
+              <p:cTn id="2" dur="indefinite" nodeType="mainSeq">
+                <p:childTnLst>
+                  <p:par>
+                    <p:cTn id="3" fill="hold">
+                      <p:stCondLst>
+                        <p:cond delay="indefinite"/>
+                      </p:stCondLst>
+                      <p:childTnLst>
+                        <p:par>
+                          <p:cTn id="4" fill="hold">
+                            <p:stCondLst>
+                              <p:cond delay="0"/>
+                            </p:stCondLst>
+                            <p:childTnLst>
+                              <p:par>
+                                <p:cTn id="5" presetID="1" presetClass="entr" presetSubtype="0" fill="hold" nodeType="clickEffect">
+                                  <p:stCondLst>
+                                    <p:cond delay="0"/>
+                                  </p:stCondLst>
+                                  <p:childTnLst>
+                                    <p:set>
+                                      <p:cBhvr>
+                                        <p:cTn id="6" dur="1" fill="hold">
+                                          <p:stCondLst>
+                                            <p:cond delay="0"/>
+                                          </p:stCondLst>
+                                        </p:cTn>
+                                        <p:tgtEl>
+                                          <p:spTgt spid="3">
+                                            <p:txEl>
+                                              <p:pRg st="0" end="0"/>
+                                            </p:txEl>
+                                          </p:spTgt>
+                                        </p:tgtEl>
+                                        <p:attrNameLst>
+                                          <p:attrName>style.visibility</p:attrName>
+                                        </p:attrNameLst>
+                                      </p:cBhvr>
+                                      <p:to>
+                                        <p:strVal val="visible"/>
+                                      </p:to>
+                                    </p:set>
+                                  </p:childTnLst>
+                                </p:cTn>
+                              </p:par>
+                            </p:childTnLst>
+                          </p:cTn>
+                        </p:par>
+                      </p:childTnLst>
+                    </p:cTn>
+                  </p:par>
+                  <p:par>
+                    <p:cTn id="7" fill="hold">
+                      <p:stCondLst>
+                        <p:cond delay="indefinite"/>
+                      </p:stCondLst>
+                      <p:childTnLst>
+                        <p:par>
+                          <p:cTn id="8" fill="hold">
+                            <p:stCondLst>
+                              <p:cond delay="0"/>
+                            </p:stCondLst>
+                            <p:childTnLst>
+                              <p:par>
+                                <p:cTn id="9" presetID="1" presetClass="entr" presetSubtype="0" fill="hold" nodeType="clickEffect">
+                                  <p:stCondLst>
+                                    <p:cond delay="0"/>
+                                  </p:stCondLst>
+                                  <p:childTnLst>
+                                    <p:set>
+                                      <p:cBhvr>
+                                        <p:cTn id="10" dur="1" fill="hold">
+                                          <p:stCondLst>
+                                            <p:cond delay="0"/>
+                                          </p:stCondLst>
+                                        </p:cTn>
+                                        <p:tgtEl>
+                                          <p:spTgt spid="3">
+                                            <p:txEl>
+                                              <p:pRg st="1" end="1"/>
+                                            </p:txEl>
+                                          </p:spTgt>
+                                        </p:tgtEl>
+                                        <p:attrNameLst>
+                                          <p:attrName>style.visibility</p:attrName>
+                                        </p:attrNameLst>
+                                      </p:cBhvr>
+                                      <p:to>
+                                        <p:strVal val="visible"/>
+                                      </p:to>
+                                    </p:set>
+                                  </p:childTnLst>
+                                </p:cTn>
+                              </p:par>
+                            </p:childTnLst>
+                          </p:cTn>
+                        </p:par>
+                      </p:childTnLst>
+                    </p:cTn>
+                  </p:par>
+                  <p:par>
+                    <p:cTn id="11" fill="hold">
+                      <p:stCondLst>
+                        <p:cond delay="indefinite"/>
+                      </p:stCondLst>
+                      <p:childTnLst>
+                        <p:par>
+                          <p:cTn id="12" fill="hold">
+                            <p:stCondLst>
+                              <p:cond delay="0"/>
+                            </p:stCondLst>
+                            <p:childTnLst>
+                              <p:par>
+                                <p:cTn id="13" presetID="1" presetClass="entr" presetSubtype="0" fill="hold" nodeType="clickEffect">
+                                  <p:stCondLst>
+                                    <p:cond delay="0"/>
+                                  </p:stCondLst>
+                                  <p:childTnLst>
+                                    <p:set>
+                                      <p:cBhvr>
+                                        <p:cTn id="14" dur="1" fill="hold">
+                                          <p:stCondLst>
+                                            <p:cond delay="0"/>
+                                          </p:stCondLst>
+                                        </p:cTn>
+                                        <p:tgtEl>
+                                          <p:spTgt spid="3">
+                                            <p:txEl>
+                                              <p:pRg st="2" end="2"/>
+                                            </p:txEl>
+                                          </p:spTgt>
+                                        </p:tgtEl>
+                                        <p:attrNameLst>
+                                          <p:attrName>style.visibility</p:attrName>
+                                        </p:attrNameLst>
+                                      </p:cBhvr>
+                                      <p:to>
+                                        <p:strVal val="visible"/>
+                                      </p:to>
+                                    </p:set>
+                                  </p:childTnLst>
+                                </p:cTn>
+                              </p:par>
+                            </p:childTnLst>
+                          </p:cTn>
+                        </p:par>
+                      </p:childTnLst>
+                    </p:cTn>
+                  </p:par>
+                </p:childTnLst>
+              </p:cTn>
+              <p:prevCondLst>
+                <p:cond evt="onPrev" delay="0">
+                  <p:tgtEl>
+                    <p:sldTgt/>
+                  </p:tgtEl>
+                </p:cond>
+              </p:prevCondLst>
+              <p:nextCondLst>
+                <p:cond evt="onNext" delay="0">
+                  <p:tgtEl>
+                    <p:sldTgt/>
+                  </p:tgtEl>
+                </p:cond>
+              </p:nextCondLst>
+            </p:seq>
+          </p:childTnLst>
+        </p:cTn>
       </p:par>
     </p:tnLst>
   </p:timing>
@@ -6201,7 +6457,7 @@
           <p:cNvPr id="8" name="Grafik 7">
             <a:extLst>
               <a:ext uri="{FF2B5EF4-FFF2-40B4-BE49-F238E27FC236}">
-                <a16:creationId xmlns="" xmlns:a16="http://schemas.microsoft.com/office/drawing/2014/main" id="{FEADF4F9-87B1-447B-A6E7-8A6D9620218C}"/>
+                <a16:creationId xmlns:a16="http://schemas.microsoft.com/office/drawing/2014/main" xmlns="" id="{FEADF4F9-87B1-447B-A6E7-8A6D9620218C}"/>
               </a:ext>
             </a:extLst>
           </p:cNvPr>

</xml_diff>